<commit_message>
More work on services
</commit_message>
<xml_diff>
--- a/rifNodeServices/NodeGeoSpatialServices.pptx
+++ b/rifNodeServices/NodeGeoSpatialServices.pptx
@@ -26,18 +26,20 @@
     <p:sldId id="273" r:id="rId20"/>
     <p:sldId id="276" r:id="rId21"/>
     <p:sldId id="278" r:id="rId22"/>
-    <p:sldId id="277" r:id="rId23"/>
-    <p:sldId id="280" r:id="rId24"/>
-    <p:sldId id="285" r:id="rId25"/>
-    <p:sldId id="281" r:id="rId26"/>
-    <p:sldId id="282" r:id="rId27"/>
-    <p:sldId id="283" r:id="rId28"/>
-    <p:sldId id="284" r:id="rId29"/>
-    <p:sldId id="286" r:id="rId30"/>
-    <p:sldId id="274" r:id="rId31"/>
-    <p:sldId id="288" r:id="rId32"/>
-    <p:sldId id="275" r:id="rId33"/>
-    <p:sldId id="287" r:id="rId34"/>
+    <p:sldId id="291" r:id="rId23"/>
+    <p:sldId id="277" r:id="rId24"/>
+    <p:sldId id="289" r:id="rId25"/>
+    <p:sldId id="280" r:id="rId26"/>
+    <p:sldId id="285" r:id="rId27"/>
+    <p:sldId id="281" r:id="rId28"/>
+    <p:sldId id="282" r:id="rId29"/>
+    <p:sldId id="283" r:id="rId30"/>
+    <p:sldId id="284" r:id="rId31"/>
+    <p:sldId id="286" r:id="rId32"/>
+    <p:sldId id="274" r:id="rId33"/>
+    <p:sldId id="288" r:id="rId34"/>
+    <p:sldId id="275" r:id="rId35"/>
+    <p:sldId id="287" r:id="rId36"/>
   </p:sldIdLst>
   <p:sldSz cx="12192000" cy="6858000"/>
   <p:notesSz cx="6858000" cy="9144000"/>
@@ -136,6 +138,11 @@
       </a:defRPr>
     </a:lvl9pPr>
   </p:defaultTextStyle>
+  <p:extLst>
+    <p:ext uri="{EFAFB233-063F-42B5-8137-9DF3F51BA10A}">
+      <p15:sldGuideLst xmlns:p15="http://schemas.microsoft.com/office/powerpoint/2012/main"/>
+    </p:ext>
+  </p:extLst>
 </p:presentation>
 </file>
 
@@ -270,7 +277,7 @@
           <a:p>
             <a:fld id="{48F32A67-F634-457D-B9F5-FA4E6813E241}" type="datetimeFigureOut">
               <a:rPr lang="en-GB" smtClean="0"/>
-              <a:t>23/02/2016</a:t>
+              <a:t>26/02/2016</a:t>
             </a:fld>
             <a:endParaRPr lang="en-GB"/>
           </a:p>
@@ -440,7 +447,7 @@
           <a:p>
             <a:fld id="{48F32A67-F634-457D-B9F5-FA4E6813E241}" type="datetimeFigureOut">
               <a:rPr lang="en-GB" smtClean="0"/>
-              <a:t>23/02/2016</a:t>
+              <a:t>26/02/2016</a:t>
             </a:fld>
             <a:endParaRPr lang="en-GB"/>
           </a:p>
@@ -620,7 +627,7 @@
           <a:p>
             <a:fld id="{48F32A67-F634-457D-B9F5-FA4E6813E241}" type="datetimeFigureOut">
               <a:rPr lang="en-GB" smtClean="0"/>
-              <a:t>23/02/2016</a:t>
+              <a:t>26/02/2016</a:t>
             </a:fld>
             <a:endParaRPr lang="en-GB"/>
           </a:p>
@@ -790,7 +797,7 @@
           <a:p>
             <a:fld id="{48F32A67-F634-457D-B9F5-FA4E6813E241}" type="datetimeFigureOut">
               <a:rPr lang="en-GB" smtClean="0"/>
-              <a:t>23/02/2016</a:t>
+              <a:t>26/02/2016</a:t>
             </a:fld>
             <a:endParaRPr lang="en-GB"/>
           </a:p>
@@ -1036,7 +1043,7 @@
           <a:p>
             <a:fld id="{48F32A67-F634-457D-B9F5-FA4E6813E241}" type="datetimeFigureOut">
               <a:rPr lang="en-GB" smtClean="0"/>
-              <a:t>23/02/2016</a:t>
+              <a:t>26/02/2016</a:t>
             </a:fld>
             <a:endParaRPr lang="en-GB"/>
           </a:p>
@@ -1268,7 +1275,7 @@
           <a:p>
             <a:fld id="{48F32A67-F634-457D-B9F5-FA4E6813E241}" type="datetimeFigureOut">
               <a:rPr lang="en-GB" smtClean="0"/>
-              <a:t>23/02/2016</a:t>
+              <a:t>26/02/2016</a:t>
             </a:fld>
             <a:endParaRPr lang="en-GB"/>
           </a:p>
@@ -1635,7 +1642,7 @@
           <a:p>
             <a:fld id="{48F32A67-F634-457D-B9F5-FA4E6813E241}" type="datetimeFigureOut">
               <a:rPr lang="en-GB" smtClean="0"/>
-              <a:t>23/02/2016</a:t>
+              <a:t>26/02/2016</a:t>
             </a:fld>
             <a:endParaRPr lang="en-GB"/>
           </a:p>
@@ -1753,7 +1760,7 @@
           <a:p>
             <a:fld id="{48F32A67-F634-457D-B9F5-FA4E6813E241}" type="datetimeFigureOut">
               <a:rPr lang="en-GB" smtClean="0"/>
-              <a:t>23/02/2016</a:t>
+              <a:t>26/02/2016</a:t>
             </a:fld>
             <a:endParaRPr lang="en-GB"/>
           </a:p>
@@ -1848,7 +1855,7 @@
           <a:p>
             <a:fld id="{48F32A67-F634-457D-B9F5-FA4E6813E241}" type="datetimeFigureOut">
               <a:rPr lang="en-GB" smtClean="0"/>
-              <a:t>23/02/2016</a:t>
+              <a:t>26/02/2016</a:t>
             </a:fld>
             <a:endParaRPr lang="en-GB"/>
           </a:p>
@@ -2125,7 +2132,7 @@
           <a:p>
             <a:fld id="{48F32A67-F634-457D-B9F5-FA4E6813E241}" type="datetimeFigureOut">
               <a:rPr lang="en-GB" smtClean="0"/>
-              <a:t>23/02/2016</a:t>
+              <a:t>26/02/2016</a:t>
             </a:fld>
             <a:endParaRPr lang="en-GB"/>
           </a:p>
@@ -2378,7 +2385,7 @@
           <a:p>
             <a:fld id="{48F32A67-F634-457D-B9F5-FA4E6813E241}" type="datetimeFigureOut">
               <a:rPr lang="en-GB" smtClean="0"/>
-              <a:t>23/02/2016</a:t>
+              <a:t>26/02/2016</a:t>
             </a:fld>
             <a:endParaRPr lang="en-GB"/>
           </a:p>
@@ -2591,7 +2598,7 @@
           <a:p>
             <a:fld id="{48F32A67-F634-457D-B9F5-FA4E6813E241}" type="datetimeFigureOut">
               <a:rPr lang="en-GB" smtClean="0"/>
-              <a:t>23/02/2016</a:t>
+              <a:t>26/02/2016</a:t>
             </a:fld>
             <a:endParaRPr lang="en-GB"/>
           </a:p>
@@ -3131,15 +3138,7 @@
           <a:p>
             <a:r>
               <a:rPr lang="en-GB" dirty="0" smtClean="0"/>
-              <a:t>Upload a set shapefiles, e.g. </a:t>
-            </a:r>
-            <a:r>
-              <a:rPr lang="en-GB" dirty="0" smtClean="0"/>
-              <a:t>five UK2011</a:t>
-            </a:r>
-            <a:r>
-              <a:rPr lang="en-GB" dirty="0" smtClean="0"/>
-              <a:t> (census output area, lower level super output area, ward, local area district, region);</a:t>
+              <a:t>Upload a set shapefiles, e.g. five UK2011 (census output area, lower level super output area, ward, local area district, region);</a:t>
             </a:r>
           </a:p>
           <a:p>
@@ -3149,7 +3148,15 @@
             </a:r>
             <a:r>
               <a:rPr lang="en-GB" dirty="0" smtClean="0"/>
-              <a:t>eometry projection detection will be automatic (i.e. a projection .</a:t>
+              <a:t>eometry projection detection will be automatic (i.e. </a:t>
+            </a:r>
+            <a:r>
+              <a:rPr lang="en-GB" dirty="0" smtClean="0"/>
+              <a:t>then ESRI </a:t>
+            </a:r>
+            <a:r>
+              <a:rPr lang="en-GB" dirty="0" smtClean="0"/>
+              <a:t>projection .</a:t>
             </a:r>
             <a:r>
               <a:rPr lang="en-GB" dirty="0" err="1" smtClean="0"/>
@@ -3163,15 +3170,7 @@
           <a:p>
             <a:r>
               <a:rPr lang="en-GB" dirty="0" smtClean="0"/>
-              <a:t>The specified shapefile </a:t>
-            </a:r>
-            <a:r>
-              <a:rPr lang="en-GB" dirty="0" smtClean="0"/>
-              <a:t>geometry column</a:t>
-            </a:r>
-            <a:r>
-              <a:rPr lang="en-GB" dirty="0" smtClean="0"/>
-              <a:t> will be converted to </a:t>
+              <a:t>The specified shapefile geometry column will be converted to </a:t>
             </a:r>
             <a:r>
               <a:rPr lang="en-GB" dirty="0" err="1" smtClean="0"/>
@@ -3288,7 +3287,15 @@
             </a:r>
             <a:r>
               <a:rPr lang="en-GB" dirty="0" smtClean="0"/>
-              <a:t>  service will validate, aggregate, clean and simplify converted shapefile data suitable for use in </a:t>
+              <a:t>  service will </a:t>
+            </a:r>
+            <a:r>
+              <a:rPr lang="en-GB" dirty="0" smtClean="0"/>
+              <a:t>load, validate</a:t>
+            </a:r>
+            <a:r>
+              <a:rPr lang="en-GB" dirty="0" smtClean="0"/>
+              <a:t>, aggregate, clean and simplify converted shapefile data suitable for use in </a:t>
             </a:r>
             <a:r>
               <a:rPr lang="en-GB" dirty="0" err="1" smtClean="0"/>
@@ -3302,7 +3309,15 @@
           <a:p>
             <a:r>
               <a:rPr lang="en-GB" dirty="0" smtClean="0"/>
-              <a:t>Run once per shapefile in the set;</a:t>
+              <a:t>Run once per </a:t>
+            </a:r>
+            <a:r>
+              <a:rPr lang="en-GB" dirty="0" smtClean="0"/>
+              <a:t>shapefile </a:t>
+            </a:r>
+            <a:r>
+              <a:rPr lang="en-GB" dirty="0" smtClean="0"/>
+              <a:t>in the set;</a:t>
             </a:r>
           </a:p>
           <a:p>
@@ -3880,13 +3895,8 @@
             </a:r>
             <a:r>
               <a:rPr lang="en-GB" dirty="0" smtClean="0"/>
-              <a:t>will be stored in a control table</a:t>
-            </a:r>
-            <a:r>
-              <a:rPr lang="en-GB" dirty="0" smtClean="0"/>
-              <a:t>;</a:t>
-            </a:r>
-            <a:endParaRPr lang="en-GB" dirty="0" smtClean="0"/>
+              <a:t>will be stored in a control table;</a:t>
+            </a:r>
           </a:p>
           <a:p>
             <a:r>
@@ -3947,13 +3957,8 @@
           <a:p>
             <a:r>
               <a:rPr lang="en-GB" dirty="0" smtClean="0"/>
-              <a:t>After v</a:t>
-            </a:r>
-            <a:r>
-              <a:rPr lang="en-GB" dirty="0" smtClean="0"/>
-              <a:t>alidation, aggregation and cleaning the geospatial data will be simplified;</a:t>
-            </a:r>
-            <a:endParaRPr lang="en-GB" dirty="0" smtClean="0"/>
+              <a:t>After validation, aggregation and cleaning the geospatial data will be simplified;</a:t>
+            </a:r>
           </a:p>
         </p:txBody>
       </p:sp>
@@ -4047,11 +4052,7 @@
           <a:p>
             <a:r>
               <a:rPr lang="en-GB" dirty="0" smtClean="0"/>
-              <a:t>The columns will be named </a:t>
-            </a:r>
-            <a:r>
-              <a:rPr lang="en-GB" dirty="0" smtClean="0"/>
-              <a:t>OPTIMISED_GEOMETRY_&lt;</a:t>
+              <a:t>The columns will be named OPTIMISED_GEOMETRY_&lt;</a:t>
             </a:r>
             <a:r>
               <a:rPr lang="en-GB" dirty="0" err="1" smtClean="0"/>
@@ -4111,11 +4112,7 @@
             </a:r>
             <a:r>
               <a:rPr lang="en-GB" dirty="0" smtClean="0"/>
-              <a:t> will also be converted to Well known Text (</a:t>
-            </a:r>
-            <a:r>
-              <a:rPr lang="en-GB" dirty="0" smtClean="0"/>
-              <a:t>OPTIMISED_WKT_&lt;</a:t>
+              <a:t> will also be converted to Well known Text (OPTIMISED_WKT_&lt;</a:t>
             </a:r>
             <a:r>
               <a:rPr lang="en-GB" dirty="0" err="1" smtClean="0"/>
@@ -4123,15 +4120,7 @@
             </a:r>
             <a:r>
               <a:rPr lang="en-GB" dirty="0" smtClean="0"/>
-              <a:t>&gt;; )</a:t>
-            </a:r>
-            <a:r>
-              <a:rPr lang="en-GB" dirty="0" smtClean="0"/>
-              <a:t>using t</a:t>
-            </a:r>
-            <a:r>
-              <a:rPr lang="en-GB" dirty="0" smtClean="0"/>
-              <a:t>he</a:t>
+              <a:t>&gt;; )using the</a:t>
             </a:r>
             <a:r>
               <a:rPr lang="en-GB" i="1" dirty="0" smtClean="0"/>
@@ -4151,15 +4140,7 @@
             </a:r>
             <a:r>
               <a:rPr lang="en-GB" dirty="0" smtClean="0"/>
-              <a:t>service. </a:t>
-            </a:r>
-            <a:r>
-              <a:rPr lang="en-GB" dirty="0" smtClean="0"/>
-              <a:t>This </a:t>
-            </a:r>
-            <a:r>
-              <a:rPr lang="en-GB" dirty="0" smtClean="0"/>
-              <a:t>allows SQL Server to support </a:t>
+              <a:t>service. This allows SQL Server to support </a:t>
             </a:r>
             <a:r>
               <a:rPr lang="en-GB" dirty="0" err="1" smtClean="0"/>
@@ -6392,11 +6373,7 @@
           <a:p>
             <a:r>
               <a:rPr lang="en-GB" dirty="0" smtClean="0"/>
-              <a:t>Usually not run directly as called from </a:t>
-            </a:r>
-            <a:r>
-              <a:rPr lang="en-GB" dirty="0" smtClean="0"/>
-              <a:t>the </a:t>
+              <a:t>Usually not run directly as called from the </a:t>
             </a:r>
             <a:r>
               <a:rPr lang="en-GB" i="1" dirty="0" err="1" smtClean="0"/>
@@ -6665,11 +6642,7 @@
             </a:r>
             <a:r>
               <a:rPr lang="en-GB" dirty="0" smtClean="0"/>
-              <a:t> service)</a:t>
-            </a:r>
-            <a:r>
-              <a:rPr lang="en-GB" dirty="0" smtClean="0"/>
-              <a:t>;</a:t>
+              <a:t> service);</a:t>
             </a:r>
           </a:p>
           <a:p>
@@ -6695,11 +6668,7 @@
             </a:r>
             <a:r>
               <a:rPr lang="en-GB" dirty="0" smtClean="0"/>
-              <a:t> service has been run</a:t>
-            </a:r>
-            <a:r>
-              <a:rPr lang="en-GB" dirty="0" smtClean="0"/>
-              <a:t>;</a:t>
+              <a:t> service has been run;</a:t>
             </a:r>
           </a:p>
           <a:p>
@@ -6777,7 +6746,7 @@
         <p:spPr/>
         <p:txBody>
           <a:bodyPr>
-            <a:normAutofit/>
+            <a:normAutofit lnSpcReduction="10000"/>
           </a:bodyPr>
           <a:lstStyle/>
           <a:p>
@@ -6840,15 +6809,7 @@
             </a:r>
             <a:r>
               <a:rPr lang="en-GB" dirty="0" smtClean="0"/>
-              <a:t> (11 by default) within the area bounds of the shapefile</a:t>
-            </a:r>
-            <a:r>
-              <a:rPr lang="en-GB" dirty="0" smtClean="0"/>
-              <a:t>;</a:t>
-            </a:r>
-            <a:r>
-              <a:rPr lang="en-GB" dirty="0" smtClean="0"/>
-              <a:t> </a:t>
+              <a:t> (11 by default) within the area bounds of the shapefile; </a:t>
             </a:r>
           </a:p>
           <a:p>
@@ -6882,8 +6843,21 @@
             </a:r>
             <a:r>
               <a:rPr lang="en-GB" dirty="0" smtClean="0"/>
-              <a:t> data back.</a:t>
-            </a:r>
+              <a:t> data </a:t>
+            </a:r>
+            <a:r>
+              <a:rPr lang="en-GB" dirty="0" smtClean="0"/>
+              <a:t>back. A separate per </a:t>
+            </a:r>
+            <a:r>
+              <a:rPr lang="en-GB" dirty="0" err="1" smtClean="0"/>
+              <a:t>maptile</a:t>
+            </a:r>
+            <a:r>
+              <a:rPr lang="en-GB" dirty="0" smtClean="0"/>
+              <a:t> get method is provided,</a:t>
+            </a:r>
+            <a:endParaRPr lang="en-GB" dirty="0" smtClean="0"/>
           </a:p>
         </p:txBody>
       </p:sp>
@@ -6973,11 +6947,7 @@
             </a:r>
             <a:r>
               <a:rPr lang="en-GB" dirty="0" smtClean="0"/>
-              <a:t> service will c</a:t>
-            </a:r>
-            <a:r>
-              <a:rPr lang="en-GB" dirty="0" smtClean="0"/>
-              <a:t>reate polygonal and population weighted centroids:</a:t>
+              <a:t> service will create polygonal and population weighted centroids:</a:t>
             </a:r>
           </a:p>
           <a:p>
@@ -7393,8 +7363,8 @@
           <a:lstStyle/>
           <a:p>
             <a:r>
-              <a:rPr lang="en-GB" i="1" dirty="0" smtClean="0"/>
-              <a:t>Shp2GeoJSON service</a:t>
+              <a:rPr lang="en-GB" dirty="0" smtClean="0"/>
+              <a:t>List of services</a:t>
             </a:r>
             <a:endParaRPr lang="en-GB" dirty="0"/>
           </a:p>
@@ -7413,20 +7383,21 @@
         <p:spPr/>
         <p:txBody>
           <a:bodyPr>
-            <a:normAutofit fontScale="85000" lnSpcReduction="20000"/>
+            <a:normAutofit fontScale="77500" lnSpcReduction="20000"/>
           </a:bodyPr>
           <a:lstStyle/>
           <a:p>
-            <a:pPr marL="0" indent="0">
-              <a:buNone/>
+            <a:pPr marL="514350" indent="-514350">
+              <a:buFont typeface="+mj-lt"/>
+              <a:buAutoNum type="arabicPeriod"/>
             </a:pPr>
             <a:r>
-              <a:rPr lang="en-GB" dirty="0" smtClean="0"/>
-              <a:t>Upload then c</a:t>
-            </a:r>
-            <a:r>
-              <a:rPr lang="en-GB" dirty="0" smtClean="0"/>
-              <a:t>onvert shapefile to </a:t>
+              <a:rPr lang="en-GB" i="1" dirty="0" smtClean="0"/>
+              <a:t>Shp2GeoJSON: </a:t>
+            </a:r>
+            <a:r>
+              <a:rPr lang="en-GB" dirty="0"/>
+              <a:t>Upload then convert shapefile to </a:t>
             </a:r>
             <a:r>
               <a:rPr lang="en-GB" dirty="0" err="1" smtClean="0"/>
@@ -7434,174 +7405,325 @@
             </a:r>
             <a:r>
               <a:rPr lang="en-GB" dirty="0" smtClean="0"/>
+              <a:t>;</a:t>
+            </a:r>
+          </a:p>
+          <a:p>
+            <a:pPr marL="514350" indent="-514350">
+              <a:buFont typeface="+mj-lt"/>
+              <a:buAutoNum type="arabicPeriod"/>
+            </a:pPr>
+            <a:r>
+              <a:rPr lang="en-GB" i="1" dirty="0" err="1" smtClean="0"/>
+              <a:t>simplifyGeoJSON</a:t>
+            </a:r>
+            <a:r>
+              <a:rPr lang="en-GB" i="1" dirty="0" smtClean="0"/>
+              <a:t>: </a:t>
+            </a:r>
+            <a:r>
+              <a:rPr lang="en-GB" dirty="0"/>
+              <a:t>Load, validate, aggregate, clean and simplify converted shapefile </a:t>
+            </a:r>
+            <a:r>
+              <a:rPr lang="en-GB" dirty="0" smtClean="0"/>
+              <a:t>data;</a:t>
+            </a:r>
+          </a:p>
+          <a:p>
+            <a:pPr marL="514350" indent="-514350">
+              <a:buFont typeface="+mj-lt"/>
+              <a:buAutoNum type="arabicPeriod"/>
+            </a:pPr>
+            <a:r>
+              <a:rPr lang="en-GB" i="1" dirty="0" err="1" smtClean="0"/>
+              <a:t>toTopoJSON</a:t>
+            </a:r>
+            <a:r>
+              <a:rPr lang="en-GB" i="1" dirty="0" smtClean="0"/>
+              <a:t>: </a:t>
+            </a:r>
+            <a:r>
+              <a:rPr lang="en-GB" dirty="0"/>
+              <a:t>Convert </a:t>
+            </a:r>
+            <a:r>
+              <a:rPr lang="en-GB" dirty="0" err="1"/>
+              <a:t>geoJSON</a:t>
+            </a:r>
+            <a:r>
+              <a:rPr lang="en-GB" dirty="0"/>
+              <a:t> to </a:t>
+            </a:r>
+            <a:r>
+              <a:rPr lang="en-GB" dirty="0" err="1" smtClean="0"/>
+              <a:t>TopoJSON</a:t>
+            </a:r>
+            <a:r>
+              <a:rPr lang="en-GB" dirty="0" smtClean="0"/>
+              <a:t>;</a:t>
+            </a:r>
+          </a:p>
+          <a:p>
+            <a:pPr marL="514350" indent="-514350">
+              <a:buFont typeface="+mj-lt"/>
+              <a:buAutoNum type="arabicPeriod"/>
+            </a:pPr>
+            <a:r>
+              <a:rPr lang="en-GB" i="1" dirty="0" err="1" smtClean="0"/>
+              <a:t>GeoJSONtoWKT</a:t>
+            </a:r>
+            <a:r>
+              <a:rPr lang="en-GB" i="1" dirty="0" smtClean="0"/>
+              <a:t>: </a:t>
+            </a:r>
+            <a:r>
+              <a:rPr lang="en-GB" dirty="0"/>
+              <a:t>Convert </a:t>
+            </a:r>
+            <a:r>
+              <a:rPr lang="en-GB" dirty="0" err="1"/>
+              <a:t>geoJSON</a:t>
+            </a:r>
+            <a:r>
+              <a:rPr lang="en-GB" dirty="0"/>
+              <a:t> to Well Known Text (WKT</a:t>
+            </a:r>
+            <a:r>
+              <a:rPr lang="en-GB" dirty="0" smtClean="0"/>
+              <a:t>);</a:t>
+            </a:r>
+          </a:p>
+          <a:p>
+            <a:pPr marL="514350" indent="-514350">
+              <a:buFont typeface="+mj-lt"/>
+              <a:buAutoNum type="arabicPeriod"/>
+            </a:pPr>
+            <a:r>
+              <a:rPr lang="en-GB" i="1" dirty="0" err="1" smtClean="0"/>
+              <a:t>createHierarchy</a:t>
+            </a:r>
+            <a:r>
+              <a:rPr lang="en-GB" i="1" dirty="0" smtClean="0"/>
+              <a:t>: </a:t>
+            </a:r>
+            <a:r>
+              <a:rPr lang="en-GB" dirty="0"/>
+              <a:t>Create hierarchical geospatial intersection of all the </a:t>
+            </a:r>
+            <a:r>
+              <a:rPr lang="en-GB" dirty="0" smtClean="0"/>
+              <a:t>shapefiles;</a:t>
+            </a:r>
+          </a:p>
+          <a:p>
+            <a:pPr marL="514350" indent="-514350">
+              <a:buFont typeface="+mj-lt"/>
+              <a:buAutoNum type="arabicPeriod"/>
+            </a:pPr>
+            <a:r>
+              <a:rPr lang="en-GB" i="1" dirty="0" err="1" smtClean="0"/>
+              <a:t>createCentroids</a:t>
+            </a:r>
+            <a:r>
+              <a:rPr lang="en-GB" i="1" dirty="0" smtClean="0"/>
+              <a:t>: </a:t>
+            </a:r>
+            <a:r>
+              <a:rPr lang="en-GB" dirty="0"/>
+              <a:t>Create centroids for all shapefiles</a:t>
+            </a:r>
+            <a:r>
+              <a:rPr lang="en-GB" dirty="0" smtClean="0"/>
+              <a:t>;</a:t>
+            </a:r>
+          </a:p>
+          <a:p>
+            <a:pPr marL="514350" indent="-514350">
+              <a:buFont typeface="+mj-lt"/>
+              <a:buAutoNum type="arabicPeriod"/>
+            </a:pPr>
+            <a:r>
+              <a:rPr lang="en-GB" i="1" dirty="0" err="1" smtClean="0"/>
+              <a:t>createMaptiles</a:t>
+            </a:r>
+            <a:r>
+              <a:rPr lang="en-GB" i="1" dirty="0" smtClean="0"/>
+              <a:t>: </a:t>
+            </a:r>
+            <a:r>
+              <a:rPr lang="en-GB" dirty="0"/>
+              <a:t>Create </a:t>
+            </a:r>
+            <a:r>
+              <a:rPr lang="en-GB" dirty="0" err="1"/>
+              <a:t>topoJSON</a:t>
+            </a:r>
+            <a:r>
+              <a:rPr lang="en-GB" dirty="0"/>
+              <a:t> </a:t>
+            </a:r>
+            <a:r>
+              <a:rPr lang="en-GB" dirty="0" err="1"/>
+              <a:t>maptiles</a:t>
+            </a:r>
+            <a:r>
+              <a:rPr lang="en-GB" dirty="0"/>
+              <a:t> for all </a:t>
+            </a:r>
+            <a:r>
+              <a:rPr lang="en-GB" dirty="0" err="1"/>
+              <a:t>geolevels</a:t>
+            </a:r>
+            <a:r>
+              <a:rPr lang="en-GB" dirty="0"/>
+              <a:t> and </a:t>
+            </a:r>
+            <a:r>
+              <a:rPr lang="en-GB" dirty="0" err="1"/>
+              <a:t>zoomlevels</a:t>
+            </a:r>
+            <a:r>
+              <a:rPr lang="en-GB" dirty="0"/>
               <a:t>; </a:t>
             </a:r>
-          </a:p>
-          <a:p>
-            <a:pPr marL="0" indent="0">
-              <a:buNone/>
+            <a:endParaRPr lang="en-GB" dirty="0" smtClean="0"/>
+          </a:p>
+          <a:p>
+            <a:pPr marL="514350" indent="-514350">
+              <a:buFont typeface="+mj-lt"/>
+              <a:buAutoNum type="arabicPeriod"/>
             </a:pPr>
             <a:r>
-              <a:rPr lang="en-GB" dirty="0" smtClean="0"/>
-              <a:t>Input: </a:t>
-            </a:r>
-          </a:p>
-          <a:p>
-            <a:r>
-              <a:rPr lang="en-GB" dirty="0" smtClean="0"/>
-              <a:t>Name: </a:t>
-            </a:r>
-            <a:r>
-              <a:rPr lang="en-GB" dirty="0" err="1" smtClean="0"/>
-              <a:t>shapefileBaseName</a:t>
-            </a:r>
-            <a:r>
-              <a:rPr lang="en-GB" dirty="0" smtClean="0"/>
-              <a:t>	Format: ESRI shapefile name without the extension;</a:t>
-            </a:r>
-          </a:p>
-          <a:p>
-            <a:r>
-              <a:rPr lang="en-GB" dirty="0" smtClean="0"/>
-              <a:t>Name: </a:t>
-            </a:r>
-            <a:r>
-              <a:rPr lang="en-GB" dirty="0" err="1" smtClean="0"/>
-              <a:t>geometryColumn</a:t>
-            </a:r>
-            <a:r>
-              <a:rPr lang="en-GB" dirty="0" smtClean="0"/>
-              <a:t>	Format: Valid database column name;</a:t>
-            </a:r>
-            <a:endParaRPr lang="en-GB" dirty="0" smtClean="0"/>
-          </a:p>
-          <a:p>
-            <a:r>
-              <a:rPr lang="en-GB" dirty="0" smtClean="0"/>
-              <a:t>Name: </a:t>
-            </a:r>
-            <a:r>
-              <a:rPr lang="en-GB" dirty="0" err="1" smtClean="0"/>
-              <a:t>sessionId</a:t>
-            </a:r>
-            <a:r>
-              <a:rPr lang="en-GB" dirty="0" smtClean="0"/>
-              <a:t>		Format: HEX string; NULL for first sha</a:t>
-            </a:r>
-            <a:r>
-              <a:rPr lang="en-GB" dirty="0" smtClean="0"/>
-              <a:t>pefile in session;</a:t>
-            </a:r>
-            <a:r>
-              <a:rPr lang="en-GB" dirty="0" smtClean="0"/>
+              <a:rPr lang="en-GB" i="1" dirty="0" err="1"/>
+              <a:t>g</a:t>
+            </a:r>
+            <a:r>
+              <a:rPr lang="en-GB" i="1" dirty="0" err="1" smtClean="0"/>
+              <a:t>etGeospatialData</a:t>
+            </a:r>
+            <a:r>
+              <a:rPr lang="en-GB" dirty="0" smtClean="0"/>
+              <a:t>: </a:t>
+            </a:r>
+            <a:r>
+              <a:rPr lang="en-GB" dirty="0"/>
+              <a:t>Fetches </a:t>
+            </a:r>
+            <a:r>
+              <a:rPr lang="en-GB" dirty="0" err="1"/>
+              <a:t>GeoSpatial</a:t>
+            </a:r>
+            <a:r>
+              <a:rPr lang="en-GB" dirty="0"/>
               <a:t> </a:t>
             </a:r>
-          </a:p>
-          <a:p>
-            <a:r>
-              <a:rPr lang="en-GB" dirty="0" smtClean="0"/>
-              <a:t>Name: store			Format: Text (true/false). If true [default</a:t>
+            <a:r>
+              <a:rPr lang="en-GB" dirty="0" smtClean="0"/>
+              <a:t>Data;</a:t>
+            </a:r>
+          </a:p>
+          <a:p>
+            <a:pPr marL="514350" indent="-514350">
+              <a:buFont typeface="+mj-lt"/>
+              <a:buAutoNum type="arabicPeriod"/>
+            </a:pPr>
+            <a:r>
+              <a:rPr lang="en-GB" i="1" dirty="0" err="1" smtClean="0"/>
+              <a:t>getNumShapefilesInSet</a:t>
+            </a:r>
+            <a:r>
+              <a:rPr lang="en-GB" dirty="0" smtClean="0"/>
+              <a:t>: </a:t>
             </a:r>
             <a:r>
               <a:rPr lang="en-GB" dirty="0"/>
-              <a:t>]</a:t>
-            </a:r>
-            <a:r>
-              <a:rPr lang="en-GB" dirty="0" smtClean="0"/>
-              <a:t> stored in 					server.</a:t>
-            </a:r>
-            <a:endParaRPr lang="en-GB" dirty="0" smtClean="0"/>
-          </a:p>
-          <a:p>
-            <a:pPr marL="0" indent="0">
-              <a:buNone/>
+              <a:t>Returns the number of shapefiles in the set. This is the same as the highest resolution </a:t>
+            </a:r>
+            <a:r>
+              <a:rPr lang="en-GB" i="1" dirty="0" err="1"/>
+              <a:t>geolevel</a:t>
+            </a:r>
+            <a:r>
+              <a:rPr lang="en-GB" i="1" dirty="0"/>
+              <a:t> id</a:t>
+            </a:r>
+            <a:r>
+              <a:rPr lang="en-GB" dirty="0" smtClean="0"/>
+              <a:t>;</a:t>
+            </a:r>
+          </a:p>
+          <a:p>
+            <a:pPr marL="514350" indent="-514350">
+              <a:buFont typeface="+mj-lt"/>
+              <a:buAutoNum type="arabicPeriod"/>
             </a:pPr>
             <a:r>
-              <a:rPr lang="en-GB" dirty="0" smtClean="0"/>
-              <a:t>Output: </a:t>
-            </a:r>
-          </a:p>
-          <a:p>
-            <a:r>
-              <a:rPr lang="en-GB" dirty="0" smtClean="0"/>
-              <a:t>Name: </a:t>
-            </a:r>
-            <a:r>
-              <a:rPr lang="en-GB" dirty="0" err="1" smtClean="0"/>
-              <a:t>wkt</a:t>
-            </a:r>
-            <a:r>
-              <a:rPr lang="en-GB" dirty="0" smtClean="0"/>
-              <a:t>			Format: Well Known Text;</a:t>
-            </a:r>
-          </a:p>
-          <a:p>
-            <a:r>
-              <a:rPr lang="en-GB" dirty="0" smtClean="0"/>
-              <a:t>Name: </a:t>
-            </a:r>
-            <a:r>
-              <a:rPr lang="en-GB" dirty="0" err="1" smtClean="0"/>
-              <a:t>sessionId</a:t>
-            </a:r>
-            <a:r>
-              <a:rPr lang="en-GB" dirty="0" smtClean="0"/>
-              <a:t>		Format: HEX string; </a:t>
-            </a:r>
-            <a:r>
-              <a:rPr lang="en-GB" dirty="0" err="1" smtClean="0"/>
-              <a:t>autogenerated</a:t>
-            </a:r>
-            <a:r>
-              <a:rPr lang="en-GB" dirty="0" smtClean="0"/>
-              <a:t> if </a:t>
-            </a:r>
-            <a:r>
-              <a:rPr lang="en-GB" dirty="0" err="1" smtClean="0"/>
-              <a:t>sessionId</a:t>
-            </a:r>
-            <a:r>
-              <a:rPr lang="en-GB" dirty="0" smtClean="0"/>
-              <a:t> is null;</a:t>
-            </a:r>
-          </a:p>
-          <a:p>
-            <a:r>
-              <a:rPr lang="en-GB" dirty="0" smtClean="0"/>
-              <a:t>Name: </a:t>
-            </a:r>
-            <a:r>
-              <a:rPr lang="en-GB" dirty="0" err="1" smtClean="0"/>
-              <a:t>geoJson</a:t>
+              <a:rPr lang="en-GB" i="1" dirty="0" err="1" smtClean="0"/>
+              <a:t>getMapTile</a:t>
+            </a:r>
+            <a:r>
+              <a:rPr lang="en-GB" dirty="0" smtClean="0"/>
+              <a:t>: Get </a:t>
+            </a:r>
+            <a:r>
+              <a:rPr lang="en-GB" dirty="0" err="1" smtClean="0"/>
+              <a:t>maptile</a:t>
+            </a:r>
+            <a:r>
+              <a:rPr lang="en-GB" dirty="0" smtClean="0"/>
+              <a:t> </a:t>
             </a:r>
             <a:r>
               <a:rPr lang="en-GB" dirty="0"/>
-              <a:t>	</a:t>
-            </a:r>
-            <a:r>
-              <a:rPr lang="en-GB" dirty="0" smtClean="0"/>
-              <a:t>	Format: </a:t>
-            </a:r>
-            <a:r>
-              <a:rPr lang="en-GB" dirty="0" err="1" smtClean="0"/>
-              <a:t>GeoJSON</a:t>
-            </a:r>
-            <a:r>
-              <a:rPr lang="en-GB" dirty="0" smtClean="0"/>
-              <a:t>; retuned if store=false.</a:t>
-            </a:r>
-            <a:endParaRPr lang="en-GB" dirty="0" smtClean="0"/>
-          </a:p>
-          <a:p>
-            <a:pPr marL="0" indent="0">
-              <a:buNone/>
+              <a:t>for specified </a:t>
+            </a:r>
+            <a:r>
+              <a:rPr lang="en-GB" dirty="0" err="1"/>
+              <a:t>geolevel</a:t>
+            </a:r>
+            <a:r>
+              <a:rPr lang="en-GB" dirty="0"/>
+              <a:t>, </a:t>
+            </a:r>
+            <a:r>
+              <a:rPr lang="en-GB" dirty="0" err="1"/>
+              <a:t>zoomlevel</a:t>
+            </a:r>
+            <a:r>
+              <a:rPr lang="en-GB" dirty="0"/>
+              <a:t>, X and Y tile </a:t>
+            </a:r>
+            <a:r>
+              <a:rPr lang="en-GB" dirty="0" smtClean="0"/>
+              <a:t>number.</a:t>
+            </a:r>
+            <a:endParaRPr lang="en-GB" dirty="0"/>
+          </a:p>
+          <a:p>
+            <a:pPr marL="514350" indent="-514350">
+              <a:buFont typeface="+mj-lt"/>
+              <a:buAutoNum type="arabicPeriod"/>
             </a:pPr>
             <a:endParaRPr lang="en-GB" dirty="0" smtClean="0"/>
           </a:p>
           <a:p>
-            <a:pPr marL="0" indent="0">
-              <a:buNone/>
+            <a:pPr marL="514350" indent="-514350">
+              <a:buFont typeface="+mj-lt"/>
+              <a:buAutoNum type="arabicPeriod"/>
             </a:pPr>
+            <a:endParaRPr lang="en-GB" dirty="0" smtClean="0"/>
+          </a:p>
+          <a:p>
+            <a:endParaRPr lang="en-GB" dirty="0"/>
+          </a:p>
+          <a:p>
+            <a:endParaRPr lang="en-GB" dirty="0" smtClean="0"/>
+          </a:p>
+          <a:p>
+            <a:endParaRPr lang="en-GB" dirty="0" smtClean="0"/>
+          </a:p>
+          <a:p>
             <a:endParaRPr lang="en-GB" dirty="0"/>
           </a:p>
         </p:txBody>
@@ -7609,7 +7731,7 @@
     </p:spTree>
     <p:extLst>
       <p:ext uri="{BB962C8B-B14F-4D97-AF65-F5344CB8AC3E}">
-        <p14:creationId xmlns:p14="http://schemas.microsoft.com/office/powerpoint/2010/main" val="2186900410"/>
+        <p14:creationId xmlns:p14="http://schemas.microsoft.com/office/powerpoint/2010/main" val="2173317142"/>
       </p:ext>
     </p:extLst>
   </p:cSld>
@@ -7652,8 +7774,12 @@
           <a:lstStyle/>
           <a:p>
             <a:r>
-              <a:rPr lang="en-GB" i="1" dirty="0" err="1" smtClean="0"/>
-              <a:t>simplifyGeoJSON</a:t>
+              <a:rPr lang="en-GB" i="1" dirty="0" smtClean="0"/>
+              <a:t>Shp2GeoJSON </a:t>
+            </a:r>
+            <a:r>
+              <a:rPr lang="en-GB" dirty="0" smtClean="0"/>
+              <a:t>service</a:t>
             </a:r>
             <a:endParaRPr lang="en-GB" dirty="0"/>
           </a:p>
@@ -7672,7 +7798,7 @@
         <p:spPr/>
         <p:txBody>
           <a:bodyPr>
-            <a:normAutofit fontScale="85000" lnSpcReduction="10000"/>
+            <a:normAutofit fontScale="70000" lnSpcReduction="20000"/>
           </a:bodyPr>
           <a:lstStyle/>
           <a:p>
@@ -7681,7 +7807,15 @@
             </a:pPr>
             <a:r>
               <a:rPr lang="en-GB" dirty="0" smtClean="0"/>
-              <a:t>Validate, aggregate, clean and simplify converted shapefile data;</a:t>
+              <a:t>Upload then convert shapefile to </a:t>
+            </a:r>
+            <a:r>
+              <a:rPr lang="en-GB" dirty="0" err="1" smtClean="0"/>
+              <a:t>geoJSON</a:t>
+            </a:r>
+            <a:r>
+              <a:rPr lang="en-GB" dirty="0" smtClean="0"/>
+              <a:t>; </a:t>
             </a:r>
           </a:p>
           <a:p>
@@ -7690,8 +7824,9 @@
             </a:pPr>
             <a:r>
               <a:rPr lang="en-GB" dirty="0" smtClean="0"/>
-              <a:t>Input: </a:t>
-            </a:r>
+              <a:t>Input fields: </a:t>
+            </a:r>
+            <a:endParaRPr lang="en-GB" dirty="0" smtClean="0"/>
           </a:p>
           <a:p>
             <a:r>
@@ -7700,19 +7835,11 @@
             </a:r>
             <a:r>
               <a:rPr lang="en-GB" dirty="0" err="1" smtClean="0"/>
-              <a:t>GeoJson</a:t>
-            </a:r>
-            <a:r>
-              <a:rPr lang="en-GB" dirty="0" smtClean="0"/>
-              <a:t>		Format: </a:t>
-            </a:r>
-            <a:r>
-              <a:rPr lang="en-GB" dirty="0" err="1" smtClean="0"/>
-              <a:t>GeoJSON</a:t>
-            </a:r>
-            <a:r>
-              <a:rPr lang="en-GB" dirty="0" smtClean="0"/>
-              <a:t>;</a:t>
+              <a:t>shapefileBaseName</a:t>
+            </a:r>
+            <a:r>
+              <a:rPr lang="en-GB" dirty="0" smtClean="0"/>
+              <a:t>	Format: ESRI shapefile name without the extension;</a:t>
             </a:r>
           </a:p>
           <a:p>
@@ -7722,11 +7849,11 @@
             </a:r>
             <a:r>
               <a:rPr lang="en-GB" dirty="0" err="1" smtClean="0"/>
-              <a:t>shapefileBaseName</a:t>
-            </a:r>
-            <a:r>
-              <a:rPr lang="en-GB" dirty="0" smtClean="0"/>
-              <a:t>	Format: ESRI shapefile name without the extension;</a:t>
+              <a:t>geometryColumn</a:t>
+            </a:r>
+            <a:r>
+              <a:rPr lang="en-GB" dirty="0" smtClean="0"/>
+              <a:t>	Format: Valid database column name;</a:t>
             </a:r>
           </a:p>
           <a:p>
@@ -7740,101 +7867,200 @@
             </a:r>
             <a:r>
               <a:rPr lang="en-GB" dirty="0" smtClean="0"/>
-              <a:t>		Format: HEX string; </a:t>
-            </a:r>
-          </a:p>
-          <a:p>
-            <a:r>
-              <a:rPr lang="en-GB" dirty="0" smtClean="0"/>
-              <a:t>Name: </a:t>
-            </a:r>
-            <a:r>
-              <a:rPr lang="en-GB" dirty="0" err="1" smtClean="0"/>
-              <a:t>areaIdColumn</a:t>
-            </a:r>
-            <a:r>
-              <a:rPr lang="en-GB" dirty="0" smtClean="0"/>
-              <a:t>	</a:t>
-            </a:r>
-            <a:r>
-              <a:rPr lang="en-GB" dirty="0" smtClean="0"/>
-              <a:t>Format: Valid database column name;</a:t>
-            </a:r>
-          </a:p>
-          <a:p>
-            <a:r>
-              <a:rPr lang="en-GB" dirty="0" smtClean="0"/>
-              <a:t>Name: </a:t>
-            </a:r>
-            <a:r>
-              <a:rPr lang="en-GB" dirty="0" err="1" smtClean="0"/>
-              <a:t>areaNameColumn</a:t>
-            </a:r>
-            <a:r>
-              <a:rPr lang="en-GB" dirty="0" smtClean="0"/>
-              <a:t>	Format: Valid database column name;</a:t>
-            </a:r>
-          </a:p>
-          <a:p>
-            <a:r>
-              <a:rPr lang="en-GB" dirty="0" smtClean="0"/>
-              <a:t>Name: simplify		Format: </a:t>
-            </a:r>
-            <a:r>
-              <a:rPr lang="en-GB" dirty="0" err="1" smtClean="0"/>
-              <a:t>dp</a:t>
-            </a:r>
-            <a:r>
-              <a:rPr lang="en-GB" dirty="0" smtClean="0"/>
-              <a:t>/</a:t>
-            </a:r>
-            <a:r>
-              <a:rPr lang="en-GB" dirty="0" err="1" smtClean="0"/>
-              <a:t>visvalingam</a:t>
-            </a:r>
-            <a:r>
-              <a:rPr lang="en-GB" dirty="0" smtClean="0"/>
-              <a:t>/weighted (See: </a:t>
-            </a:r>
-            <a:r>
-              <a:rPr lang="en-GB" dirty="0" smtClean="0">
-                <a:hlinkClick r:id="rId2"/>
-              </a:rPr>
-              <a:t>https://github.com/mbloch/mapshaper/wiki/Command-Reference</a:t>
-            </a:r>
-            <a:r>
-              <a:rPr lang="en-GB" dirty="0" smtClean="0"/>
-              <a:t>) </a:t>
-            </a:r>
-          </a:p>
-          <a:p>
-            <a:r>
-              <a:rPr lang="en-GB" dirty="0" smtClean="0"/>
-              <a:t>Name: </a:t>
-            </a:r>
-            <a:r>
-              <a:rPr lang="en-GB" dirty="0" err="1" smtClean="0"/>
-              <a:t>Zoomolevels</a:t>
-            </a:r>
-            <a:r>
-              <a:rPr lang="en-GB" dirty="0" smtClean="0"/>
-              <a:t>		Format: An array of integer </a:t>
-            </a:r>
-            <a:r>
-              <a:rPr lang="en-GB" dirty="0" err="1" smtClean="0"/>
-              <a:t>zoomlevels</a:t>
-            </a:r>
-            <a:r>
-              <a:rPr lang="en-GB" dirty="0" smtClean="0"/>
-              <a:t> (0-19); default 				[6,8,11]</a:t>
-            </a:r>
+              <a:t>		Format: HEX string; NULL for first shapefile in session; </a:t>
+            </a:r>
+          </a:p>
+          <a:p>
+            <a:r>
+              <a:rPr lang="en-GB" dirty="0" smtClean="0"/>
+              <a:t>Name: store			Format: Text (true/false). If true [default</a:t>
+            </a:r>
+            <a:r>
+              <a:rPr lang="en-GB" dirty="0"/>
+              <a:t>]</a:t>
+            </a:r>
+            <a:r>
+              <a:rPr lang="en-GB" dirty="0" smtClean="0"/>
+              <a:t> stored in </a:t>
+            </a:r>
+            <a:r>
+              <a:rPr lang="en-GB" dirty="0" smtClean="0"/>
+              <a:t>server.</a:t>
+            </a:r>
+          </a:p>
+          <a:p>
+            <a:pPr marL="0" indent="0">
+              <a:buNone/>
+            </a:pPr>
+            <a:r>
+              <a:rPr lang="en-GB" dirty="0" smtClean="0"/>
+              <a:t>Mandatory input files (required; may be </a:t>
+            </a:r>
+            <a:r>
+              <a:rPr lang="en-GB" dirty="0" err="1" smtClean="0"/>
+              <a:t>Gzip</a:t>
+            </a:r>
+            <a:r>
+              <a:rPr lang="en-GB" dirty="0" smtClean="0"/>
+              <a:t> or lz77 compressed):</a:t>
+            </a:r>
+          </a:p>
+          <a:p>
+            <a:r>
+              <a:rPr lang="en-GB" dirty="0" smtClean="0"/>
+              <a:t>.</a:t>
+            </a:r>
+            <a:r>
+              <a:rPr lang="en-GB" dirty="0" err="1" smtClean="0"/>
+              <a:t>shp</a:t>
+            </a:r>
+            <a:r>
+              <a:rPr lang="en-GB" dirty="0" smtClean="0"/>
+              <a:t> – ESRI shapefile;</a:t>
+            </a:r>
+          </a:p>
+          <a:p>
+            <a:r>
+              <a:rPr lang="en-GB" dirty="0" smtClean="0"/>
+              <a:t>.dbf – Dbase IV database files;</a:t>
+            </a:r>
+          </a:p>
+          <a:p>
+            <a:r>
+              <a:rPr lang="en-GB" dirty="0" smtClean="0"/>
+              <a:t>.</a:t>
+            </a:r>
+            <a:r>
+              <a:rPr lang="en-GB" dirty="0" err="1" smtClean="0"/>
+              <a:t>prj</a:t>
+            </a:r>
+            <a:r>
+              <a:rPr lang="en-GB" dirty="0" smtClean="0"/>
+              <a:t> – ESRI projection file;</a:t>
+            </a:r>
+          </a:p>
+          <a:p>
+            <a:r>
+              <a:rPr lang="en-GB" dirty="0" smtClean="0"/>
+              <a:t>.smp.xml – Shapefile geospatial metadata (ISO 19115) [OPTIONAL];</a:t>
+            </a:r>
+          </a:p>
+          <a:p>
+            <a:pPr marL="0" indent="0">
+              <a:buNone/>
+            </a:pPr>
+            <a:r>
+              <a:rPr lang="en-GB" dirty="0" smtClean="0"/>
+              <a:t>All other extension types (.</a:t>
+            </a:r>
+            <a:r>
+              <a:rPr lang="en-GB" dirty="0" err="1" smtClean="0"/>
+              <a:t>sbn</a:t>
+            </a:r>
+            <a:r>
+              <a:rPr lang="en-GB" dirty="0" smtClean="0"/>
+              <a:t>, .</a:t>
+            </a:r>
+            <a:r>
+              <a:rPr lang="en-GB" dirty="0" err="1" smtClean="0"/>
+              <a:t>sbx</a:t>
+            </a:r>
+            <a:r>
+              <a:rPr lang="en-GB" dirty="0" smtClean="0"/>
+              <a:t>, .</a:t>
+            </a:r>
+            <a:r>
+              <a:rPr lang="en-GB" dirty="0" err="1" smtClean="0"/>
+              <a:t>fbn</a:t>
+            </a:r>
+            <a:r>
+              <a:rPr lang="en-GB" dirty="0" smtClean="0"/>
+              <a:t>, .</a:t>
+            </a:r>
+            <a:r>
+              <a:rPr lang="en-GB" dirty="0" err="1" smtClean="0"/>
+              <a:t>fbx</a:t>
+            </a:r>
+            <a:r>
+              <a:rPr lang="en-GB" dirty="0" smtClean="0"/>
+              <a:t>, .</a:t>
+            </a:r>
+            <a:r>
+              <a:rPr lang="en-GB" dirty="0" err="1" smtClean="0"/>
+              <a:t>ain</a:t>
+            </a:r>
+            <a:r>
+              <a:rPr lang="en-GB" dirty="0" smtClean="0"/>
+              <a:t>, .</a:t>
+            </a:r>
+            <a:r>
+              <a:rPr lang="en-GB" dirty="0" err="1" smtClean="0"/>
+              <a:t>aih</a:t>
+            </a:r>
+            <a:r>
+              <a:rPr lang="en-GB" dirty="0" smtClean="0"/>
+              <a:t>, .</a:t>
+            </a:r>
+            <a:r>
+              <a:rPr lang="en-GB" dirty="0" err="1" smtClean="0"/>
+              <a:t>ixs</a:t>
+            </a:r>
+            <a:r>
+              <a:rPr lang="en-GB" dirty="0" smtClean="0"/>
+              <a:t>, .</a:t>
+            </a:r>
+            <a:r>
+              <a:rPr lang="en-GB" dirty="0" err="1" smtClean="0"/>
+              <a:t>mxs</a:t>
+            </a:r>
+            <a:r>
+              <a:rPr lang="en-GB" dirty="0" smtClean="0"/>
+              <a:t>, .</a:t>
+            </a:r>
+            <a:r>
+              <a:rPr lang="en-GB" dirty="0" err="1" smtClean="0"/>
+              <a:t>atx</a:t>
+            </a:r>
+            <a:r>
+              <a:rPr lang="en-GB" dirty="0" smtClean="0"/>
+              <a:t>, .</a:t>
+            </a:r>
+            <a:r>
+              <a:rPr lang="en-GB" dirty="0" err="1" smtClean="0"/>
+              <a:t>cpg</a:t>
+            </a:r>
+            <a:r>
+              <a:rPr lang="en-GB" dirty="0" smtClean="0"/>
+              <a:t>, .</a:t>
+            </a:r>
+            <a:r>
+              <a:rPr lang="en-GB" dirty="0" err="1" smtClean="0"/>
+              <a:t>qix</a:t>
+            </a:r>
+            <a:r>
+              <a:rPr lang="en-GB" dirty="0" smtClean="0"/>
+              <a:t>) are saved but otherwise ignored.</a:t>
+            </a:r>
+            <a:endParaRPr lang="en-GB" dirty="0" smtClean="0"/>
+          </a:p>
+          <a:p>
+            <a:pPr marL="0" indent="0">
+              <a:buNone/>
+            </a:pPr>
+            <a:endParaRPr lang="en-GB" dirty="0" smtClean="0"/>
+          </a:p>
+          <a:p>
+            <a:pPr marL="0" indent="0">
+              <a:buNone/>
+            </a:pPr>
+            <a:endParaRPr lang="en-GB" dirty="0"/>
           </a:p>
         </p:txBody>
       </p:sp>
     </p:spTree>
     <p:extLst>
       <p:ext uri="{BB962C8B-B14F-4D97-AF65-F5344CB8AC3E}">
-        <p14:creationId xmlns:p14="http://schemas.microsoft.com/office/powerpoint/2010/main" val="2000269487"/>
+        <p14:creationId xmlns:p14="http://schemas.microsoft.com/office/powerpoint/2010/main" val="2186900410"/>
       </p:ext>
     </p:extLst>
   </p:cSld>
@@ -7877,12 +8103,12 @@
           <a:lstStyle/>
           <a:p>
             <a:r>
-              <a:rPr lang="en-GB" i="1" dirty="0" err="1" smtClean="0"/>
-              <a:t>simplifyGeoJSON</a:t>
-            </a:r>
-            <a:r>
-              <a:rPr lang="en-GB" i="1" dirty="0" smtClean="0"/>
-              <a:t> (2)</a:t>
+              <a:rPr lang="en-GB" i="1" dirty="0"/>
+              <a:t>Shp2GeoJSON </a:t>
+            </a:r>
+            <a:r>
+              <a:rPr lang="en-GB" dirty="0" smtClean="0"/>
+              <a:t>service (2)</a:t>
             </a:r>
             <a:endParaRPr lang="en-GB" dirty="0"/>
           </a:p>
@@ -7908,167 +8134,96 @@
             </a:pPr>
             <a:r>
               <a:rPr lang="en-GB" dirty="0" smtClean="0"/>
-              <a:t>Output: </a:t>
-            </a:r>
-          </a:p>
-          <a:p>
-            <a:pPr marL="0" indent="0">
-              <a:buNone/>
-            </a:pPr>
-            <a:r>
-              <a:rPr lang="en-GB" dirty="0" smtClean="0"/>
+              <a:t>Output JSON: </a:t>
+            </a:r>
+            <a:endParaRPr lang="en-GB" dirty="0"/>
+          </a:p>
+          <a:p>
+            <a:r>
+              <a:rPr lang="en-GB" dirty="0"/>
               <a:t>Name: </a:t>
             </a:r>
             <a:r>
-              <a:rPr lang="en-GB" dirty="0" err="1" smtClean="0"/>
-              <a:t>boundingBox</a:t>
-            </a:r>
-            <a:r>
-              <a:rPr lang="en-GB" dirty="0" smtClean="0"/>
-              <a:t>	Format: Object [</a:t>
-            </a:r>
-          </a:p>
-          <a:p>
-            <a:pPr marL="0" indent="0">
-              <a:buNone/>
-            </a:pPr>
-            <a:r>
-              <a:rPr lang="en-GB" dirty="0" smtClean="0"/>
-              <a:t>				</a:t>
-            </a:r>
-            <a:r>
-              <a:rPr lang="fr-FR" sz="2400" dirty="0" smtClean="0"/>
-              <a:t>double </a:t>
-            </a:r>
-            <a:r>
-              <a:rPr lang="fr-FR" sz="2400" dirty="0" err="1" smtClean="0"/>
-              <a:t>precision</a:t>
-            </a:r>
-            <a:r>
-              <a:rPr lang="fr-FR" sz="2400" dirty="0" smtClean="0"/>
-              <a:t> </a:t>
-            </a:r>
-            <a:r>
-              <a:rPr lang="fr-FR" sz="2400" i="1" dirty="0" err="1" smtClean="0"/>
-              <a:t>xmin</a:t>
-            </a:r>
-            <a:r>
-              <a:rPr lang="fr-FR" sz="2400" dirty="0" smtClean="0"/>
-              <a:t>, double </a:t>
-            </a:r>
-            <a:r>
-              <a:rPr lang="fr-FR" sz="2400" dirty="0" err="1" smtClean="0"/>
-              <a:t>precision</a:t>
-            </a:r>
-            <a:r>
-              <a:rPr lang="fr-FR" sz="2400" dirty="0" smtClean="0"/>
-              <a:t> </a:t>
-            </a:r>
-            <a:r>
-              <a:rPr lang="fr-FR" sz="2400" i="1" dirty="0" err="1" smtClean="0"/>
-              <a:t>ymin</a:t>
-            </a:r>
-            <a:r>
-              <a:rPr lang="fr-FR" sz="2400" dirty="0" smtClean="0"/>
-              <a:t>,</a:t>
-            </a:r>
-          </a:p>
-          <a:p>
-            <a:pPr marL="0" indent="0">
-              <a:buNone/>
-            </a:pPr>
-            <a:r>
-              <a:rPr lang="fr-FR" sz="2400" dirty="0" smtClean="0"/>
-              <a:t> 				double </a:t>
-            </a:r>
-            <a:r>
-              <a:rPr lang="fr-FR" sz="2400" dirty="0" err="1" smtClean="0"/>
-              <a:t>precision</a:t>
-            </a:r>
-            <a:r>
-              <a:rPr lang="fr-FR" sz="2400" dirty="0" smtClean="0"/>
-              <a:t> </a:t>
-            </a:r>
-            <a:r>
-              <a:rPr lang="fr-FR" sz="2400" i="1" dirty="0" err="1" smtClean="0"/>
-              <a:t>xmax</a:t>
-            </a:r>
-            <a:r>
-              <a:rPr lang="fr-FR" sz="2400" dirty="0" smtClean="0"/>
-              <a:t>, double </a:t>
-            </a:r>
-            <a:r>
-              <a:rPr lang="fr-FR" sz="2400" dirty="0" err="1" smtClean="0"/>
-              <a:t>precision</a:t>
-            </a:r>
-            <a:r>
-              <a:rPr lang="fr-FR" sz="2400" dirty="0" smtClean="0"/>
-              <a:t> </a:t>
-            </a:r>
-            <a:r>
-              <a:rPr lang="fr-FR" sz="2400" i="1" dirty="0" err="1" smtClean="0"/>
-              <a:t>ymax</a:t>
-            </a:r>
-            <a:r>
-              <a:rPr lang="fr-FR" sz="2400" dirty="0" smtClean="0"/>
-              <a:t>,</a:t>
-            </a:r>
-          </a:p>
-          <a:p>
-            <a:pPr marL="0" indent="0">
-              <a:buNone/>
-            </a:pPr>
-            <a:r>
-              <a:rPr lang="fr-FR" sz="2400" dirty="0" smtClean="0"/>
-              <a:t> 				</a:t>
-            </a:r>
-            <a:r>
-              <a:rPr lang="fr-FR" sz="2400" dirty="0" err="1" smtClean="0"/>
-              <a:t>integer</a:t>
-            </a:r>
-            <a:r>
-              <a:rPr lang="fr-FR" sz="2400" dirty="0" smtClean="0"/>
-              <a:t> </a:t>
-            </a:r>
-            <a:r>
-              <a:rPr lang="fr-FR" sz="2400" i="1" dirty="0" err="1" smtClean="0"/>
-              <a:t>srid</a:t>
-            </a:r>
-            <a:r>
-              <a:rPr lang="fr-FR" i="1" dirty="0" smtClean="0"/>
-              <a:t>];</a:t>
-            </a:r>
-            <a:endParaRPr lang="en-GB" dirty="0" smtClean="0"/>
-          </a:p>
-          <a:p>
-            <a:pPr marL="0" indent="0">
-              <a:buNone/>
-            </a:pPr>
-            <a:r>
-              <a:rPr lang="en-GB" dirty="0" smtClean="0"/>
+              <a:rPr lang="en-GB" dirty="0" err="1"/>
+              <a:t>wkt</a:t>
+            </a:r>
+            <a:r>
+              <a:rPr lang="en-GB" dirty="0"/>
+              <a:t>			Format: Well Known </a:t>
+            </a:r>
+            <a:r>
+              <a:rPr lang="en-GB" dirty="0" smtClean="0"/>
+              <a:t>Text; </a:t>
+            </a:r>
+            <a:r>
+              <a:rPr lang="en-GB" dirty="0"/>
+              <a:t>returned if </a:t>
+            </a:r>
+            <a:r>
+              <a:rPr lang="en-GB" dirty="0" smtClean="0"/>
+              <a:t>						store=false;</a:t>
+            </a:r>
+            <a:endParaRPr lang="en-GB" dirty="0"/>
+          </a:p>
+          <a:p>
+            <a:r>
+              <a:rPr lang="en-GB" dirty="0"/>
               <a:t>Name: </a:t>
             </a:r>
             <a:r>
-              <a:rPr lang="en-GB" dirty="0" err="1" smtClean="0"/>
-              <a:t>lookupTable</a:t>
-            </a:r>
-            <a:r>
-              <a:rPr lang="en-GB" dirty="0" smtClean="0"/>
-              <a:t>	Format: An array of </a:t>
-            </a:r>
-            <a:r>
-              <a:rPr lang="en-GB" i="1" dirty="0" smtClean="0"/>
-              <a:t>area id </a:t>
-            </a:r>
-            <a:r>
-              <a:rPr lang="en-GB" dirty="0" smtClean="0"/>
-              <a:t>and </a:t>
-            </a:r>
-            <a:r>
-              <a:rPr lang="en-GB" i="1" dirty="0" smtClean="0"/>
-              <a:t>area name 					pairs.</a:t>
-            </a:r>
-            <a:endParaRPr lang="en-GB" dirty="0" smtClean="0"/>
+              <a:rPr lang="en-GB" dirty="0" err="1"/>
+              <a:t>sessionId</a:t>
+            </a:r>
+            <a:r>
+              <a:rPr lang="en-GB" dirty="0"/>
+              <a:t>		Format: HEX string; </a:t>
+            </a:r>
+            <a:r>
+              <a:rPr lang="en-GB" dirty="0" err="1"/>
+              <a:t>autogenerated</a:t>
+            </a:r>
+            <a:r>
+              <a:rPr lang="en-GB" dirty="0"/>
+              <a:t> if </a:t>
+            </a:r>
+            <a:r>
+              <a:rPr lang="en-GB" dirty="0" err="1"/>
+              <a:t>sessionId</a:t>
+            </a:r>
+            <a:r>
+              <a:rPr lang="en-GB" dirty="0"/>
+              <a:t> is null;</a:t>
+            </a:r>
+          </a:p>
+          <a:p>
+            <a:r>
+              <a:rPr lang="en-GB" dirty="0"/>
+              <a:t>Name: </a:t>
+            </a:r>
+            <a:r>
+              <a:rPr lang="en-GB" dirty="0" err="1"/>
+              <a:t>geoJson</a:t>
+            </a:r>
+            <a:r>
+              <a:rPr lang="en-GB" dirty="0"/>
+              <a:t>		Format: </a:t>
+            </a:r>
+            <a:r>
+              <a:rPr lang="en-GB" dirty="0" err="1"/>
+              <a:t>GeoJSON</a:t>
+            </a:r>
+            <a:r>
+              <a:rPr lang="en-GB" dirty="0"/>
+              <a:t>; </a:t>
+            </a:r>
+            <a:r>
+              <a:rPr lang="en-GB" dirty="0" smtClean="0"/>
+              <a:t>returned </a:t>
+            </a:r>
+            <a:r>
+              <a:rPr lang="en-GB" dirty="0"/>
+              <a:t>if store=false.</a:t>
+            </a:r>
           </a:p>
           <a:p>
             <a:pPr marL="0" indent="0">
@@ -8081,7 +8236,7 @@
     </p:spTree>
     <p:extLst>
       <p:ext uri="{BB962C8B-B14F-4D97-AF65-F5344CB8AC3E}">
-        <p14:creationId xmlns:p14="http://schemas.microsoft.com/office/powerpoint/2010/main" val="3026306766"/>
+        <p14:creationId xmlns:p14="http://schemas.microsoft.com/office/powerpoint/2010/main" val="3324641840"/>
       </p:ext>
     </p:extLst>
   </p:cSld>
@@ -8125,7 +8280,7 @@
           <a:p>
             <a:r>
               <a:rPr lang="en-GB" i="1" dirty="0" err="1" smtClean="0"/>
-              <a:t>toTopoJSON</a:t>
+              <a:t>simplifyGeoJSON</a:t>
             </a:r>
             <a:endParaRPr lang="en-GB" dirty="0"/>
           </a:p>
@@ -8143,7 +8298,9 @@
         </p:nvSpPr>
         <p:spPr/>
         <p:txBody>
-          <a:bodyPr/>
+          <a:bodyPr>
+            <a:normAutofit fontScale="85000" lnSpcReduction="10000"/>
+          </a:bodyPr>
           <a:lstStyle/>
           <a:p>
             <a:pPr marL="0" indent="0">
@@ -8151,19 +8308,43 @@
             </a:pPr>
             <a:r>
               <a:rPr lang="en-GB" dirty="0" smtClean="0"/>
-              <a:t>Convert </a:t>
-            </a:r>
-            <a:r>
-              <a:rPr lang="en-GB" dirty="0" err="1" smtClean="0"/>
-              <a:t>geoJSON</a:t>
-            </a:r>
-            <a:r>
-              <a:rPr lang="en-GB" dirty="0" smtClean="0"/>
-              <a:t> to </a:t>
-            </a:r>
-            <a:r>
-              <a:rPr lang="en-GB" dirty="0" err="1" smtClean="0"/>
-              <a:t>TopoJSON</a:t>
+              <a:t>Load, v</a:t>
+            </a:r>
+            <a:r>
+              <a:rPr lang="en-GB" dirty="0" smtClean="0"/>
+              <a:t>alidate</a:t>
+            </a:r>
+            <a:r>
+              <a:rPr lang="en-GB" dirty="0" smtClean="0"/>
+              <a:t>, aggregate, clean and simplify converted shapefile data;</a:t>
+            </a:r>
+          </a:p>
+          <a:p>
+            <a:pPr marL="0" indent="0">
+              <a:buNone/>
+            </a:pPr>
+            <a:r>
+              <a:rPr lang="en-GB" dirty="0" smtClean="0"/>
+              <a:t>Input fields: </a:t>
+            </a:r>
+            <a:endParaRPr lang="en-GB" dirty="0" smtClean="0"/>
+          </a:p>
+          <a:p>
+            <a:r>
+              <a:rPr lang="en-GB" dirty="0" smtClean="0"/>
+              <a:t>Name: </a:t>
+            </a:r>
+            <a:r>
+              <a:rPr lang="en-GB" dirty="0" err="1" smtClean="0"/>
+              <a:t>GeoJson</a:t>
+            </a:r>
+            <a:r>
+              <a:rPr lang="en-GB" dirty="0" smtClean="0"/>
+              <a:t>		Format: </a:t>
+            </a:r>
+            <a:r>
+              <a:rPr lang="en-GB" dirty="0" err="1" smtClean="0"/>
+              <a:t>GeoJSON</a:t>
             </a:r>
             <a:r>
               <a:rPr lang="en-GB" dirty="0" smtClean="0"/>
@@ -8171,40 +8352,17 @@
             </a:r>
           </a:p>
           <a:p>
-            <a:pPr marL="0" indent="0">
-              <a:buNone/>
-            </a:pPr>
-            <a:r>
-              <a:rPr lang="en-GB" dirty="0" smtClean="0"/>
-              <a:t>Input: </a:t>
-            </a:r>
-          </a:p>
-          <a:p>
             <a:r>
               <a:rPr lang="en-GB" dirty="0" smtClean="0"/>
               <a:t>Name: </a:t>
             </a:r>
             <a:r>
               <a:rPr lang="en-GB" dirty="0" err="1" smtClean="0"/>
-              <a:t>Geojson</a:t>
-            </a:r>
-            <a:r>
-              <a:rPr lang="en-GB" dirty="0" smtClean="0"/>
-              <a:t>	Format: </a:t>
-            </a:r>
-            <a:r>
-              <a:rPr lang="en-GB" dirty="0" err="1" smtClean="0"/>
-              <a:t>geoJSON</a:t>
-            </a:r>
-            <a:endParaRPr lang="en-GB" dirty="0" smtClean="0"/>
-          </a:p>
-          <a:p>
-            <a:pPr marL="0" indent="0">
-              <a:buNone/>
-            </a:pPr>
-            <a:r>
-              <a:rPr lang="en-GB" dirty="0" smtClean="0"/>
-              <a:t>Output: </a:t>
+              <a:t>shapefileBaseName</a:t>
+            </a:r>
+            <a:r>
+              <a:rPr lang="en-GB" dirty="0" smtClean="0"/>
+              <a:t>	Format: ESRI shapefile name without the extension;</a:t>
             </a:r>
           </a:p>
           <a:p>
@@ -8214,24 +8372,101 @@
             </a:r>
             <a:r>
               <a:rPr lang="en-GB" dirty="0" err="1" smtClean="0"/>
-              <a:t>topojson</a:t>
-            </a:r>
-            <a:r>
-              <a:rPr lang="en-GB" dirty="0" smtClean="0"/>
-              <a:t>	Format: </a:t>
-            </a:r>
-            <a:r>
-              <a:rPr lang="en-GB" dirty="0" err="1" smtClean="0"/>
-              <a:t>topoJSON</a:t>
-            </a:r>
-            <a:endParaRPr lang="en-GB" dirty="0"/>
+              <a:t>sessionId</a:t>
+            </a:r>
+            <a:r>
+              <a:rPr lang="en-GB" dirty="0" smtClean="0"/>
+              <a:t>		Format: HEX string; </a:t>
+            </a:r>
+          </a:p>
+          <a:p>
+            <a:r>
+              <a:rPr lang="en-GB" dirty="0" smtClean="0"/>
+              <a:t>Name: </a:t>
+            </a:r>
+            <a:r>
+              <a:rPr lang="en-GB" dirty="0" err="1" smtClean="0"/>
+              <a:t>areaIdColumn</a:t>
+            </a:r>
+            <a:r>
+              <a:rPr lang="en-GB" dirty="0" smtClean="0"/>
+              <a:t>	Format: Valid database column name;</a:t>
+            </a:r>
+          </a:p>
+          <a:p>
+            <a:r>
+              <a:rPr lang="en-GB" dirty="0" smtClean="0"/>
+              <a:t>Name: </a:t>
+            </a:r>
+            <a:r>
+              <a:rPr lang="en-GB" dirty="0" err="1" smtClean="0"/>
+              <a:t>areaNameColumn</a:t>
+            </a:r>
+            <a:r>
+              <a:rPr lang="en-GB" dirty="0" smtClean="0"/>
+              <a:t>	Format: Valid database column name;</a:t>
+            </a:r>
+          </a:p>
+          <a:p>
+            <a:r>
+              <a:rPr lang="en-GB" dirty="0" smtClean="0"/>
+              <a:t>Name: simplify		Format: </a:t>
+            </a:r>
+            <a:r>
+              <a:rPr lang="en-GB" dirty="0" err="1" smtClean="0"/>
+              <a:t>dp</a:t>
+            </a:r>
+            <a:r>
+              <a:rPr lang="en-GB" dirty="0" smtClean="0"/>
+              <a:t>/</a:t>
+            </a:r>
+            <a:r>
+              <a:rPr lang="en-GB" dirty="0" err="1" smtClean="0"/>
+              <a:t>visvalingam</a:t>
+            </a:r>
+            <a:r>
+              <a:rPr lang="en-GB" dirty="0" smtClean="0"/>
+              <a:t>/weighted (See: </a:t>
+            </a:r>
+            <a:r>
+              <a:rPr lang="en-GB" dirty="0" smtClean="0">
+                <a:hlinkClick r:id="rId2"/>
+              </a:rPr>
+              <a:t>https://github.com/mbloch/mapshaper/wiki/Command-Reference</a:t>
+            </a:r>
+            <a:r>
+              <a:rPr lang="en-GB" dirty="0" smtClean="0"/>
+              <a:t>) </a:t>
+            </a:r>
+          </a:p>
+          <a:p>
+            <a:r>
+              <a:rPr lang="en-GB" dirty="0" smtClean="0"/>
+              <a:t>Name: </a:t>
+            </a:r>
+            <a:r>
+              <a:rPr lang="en-GB" dirty="0" err="1" smtClean="0"/>
+              <a:t>Zoomolevels</a:t>
+            </a:r>
+            <a:r>
+              <a:rPr lang="en-GB" dirty="0" smtClean="0"/>
+              <a:t>		Format: An array of integer </a:t>
+            </a:r>
+            <a:r>
+              <a:rPr lang="en-GB" dirty="0" err="1" smtClean="0"/>
+              <a:t>zoomlevels</a:t>
+            </a:r>
+            <a:r>
+              <a:rPr lang="en-GB" dirty="0" smtClean="0"/>
+              <a:t> (0-19); default 				[6,8,11]</a:t>
+            </a:r>
           </a:p>
         </p:txBody>
       </p:sp>
     </p:spTree>
     <p:extLst>
       <p:ext uri="{BB962C8B-B14F-4D97-AF65-F5344CB8AC3E}">
-        <p14:creationId xmlns:p14="http://schemas.microsoft.com/office/powerpoint/2010/main" val="1029057735"/>
+        <p14:creationId xmlns:p14="http://schemas.microsoft.com/office/powerpoint/2010/main" val="2000269487"/>
       </p:ext>
     </p:extLst>
   </p:cSld>
@@ -8275,7 +8510,23 @@
           <a:p>
             <a:r>
               <a:rPr lang="en-GB" i="1" dirty="0" err="1" smtClean="0"/>
-              <a:t>GeoJSONtoWKT</a:t>
+              <a:t>simplifyGeoJSON</a:t>
+            </a:r>
+            <a:r>
+              <a:rPr lang="en-GB" i="1" dirty="0" smtClean="0"/>
+              <a:t> </a:t>
+            </a:r>
+            <a:r>
+              <a:rPr lang="en-GB" dirty="0"/>
+              <a:t>service </a:t>
+            </a:r>
+            <a:r>
+              <a:rPr lang="en-GB" dirty="0" smtClean="0"/>
+              <a:t>(</a:t>
+            </a:r>
+            <a:r>
+              <a:rPr lang="en-GB" dirty="0" smtClean="0"/>
+              <a:t>2)</a:t>
             </a:r>
             <a:endParaRPr lang="en-GB" dirty="0"/>
           </a:p>
@@ -8301,16 +8552,9 @@
             </a:pPr>
             <a:r>
               <a:rPr lang="en-GB" dirty="0" smtClean="0"/>
-              <a:t>Convert </a:t>
-            </a:r>
-            <a:r>
-              <a:rPr lang="en-GB" dirty="0" err="1" smtClean="0"/>
-              <a:t>geoJSON</a:t>
-            </a:r>
-            <a:r>
-              <a:rPr lang="en-GB" dirty="0" smtClean="0"/>
-              <a:t> to Well Known Text (WKT);</a:t>
-            </a:r>
+              <a:t>Output JSON: </a:t>
+            </a:r>
+            <a:endParaRPr lang="en-GB" dirty="0" smtClean="0"/>
           </a:p>
           <a:p>
             <a:pPr marL="0" indent="0">
@@ -8318,25 +8562,126 @@
             </a:pPr>
             <a:r>
               <a:rPr lang="en-GB" dirty="0" smtClean="0"/>
-              <a:t>Input: </a:t>
-            </a:r>
-          </a:p>
-          <a:p>
-            <a:r>
-              <a:rPr lang="en-GB" dirty="0" smtClean="0"/>
               <a:t>Name: </a:t>
             </a:r>
             <a:r>
               <a:rPr lang="en-GB" dirty="0" err="1" smtClean="0"/>
-              <a:t>Geojson</a:t>
-            </a:r>
-            <a:r>
-              <a:rPr lang="en-GB" dirty="0" smtClean="0"/>
-              <a:t>	Format: </a:t>
-            </a:r>
-            <a:r>
-              <a:rPr lang="en-GB" dirty="0" err="1" smtClean="0"/>
-              <a:t>geoJSON</a:t>
+              <a:t>boundingBox</a:t>
+            </a:r>
+            <a:r>
+              <a:rPr lang="en-GB" dirty="0" smtClean="0"/>
+              <a:t>	Format: Object [</a:t>
+            </a:r>
+          </a:p>
+          <a:p>
+            <a:pPr marL="0" indent="0">
+              <a:buNone/>
+            </a:pPr>
+            <a:r>
+              <a:rPr lang="en-GB" dirty="0" smtClean="0"/>
+              <a:t>				</a:t>
+            </a:r>
+            <a:r>
+              <a:rPr lang="fr-FR" sz="2400" dirty="0" smtClean="0"/>
+              <a:t>double </a:t>
+            </a:r>
+            <a:r>
+              <a:rPr lang="fr-FR" sz="2400" dirty="0" err="1" smtClean="0"/>
+              <a:t>precision</a:t>
+            </a:r>
+            <a:r>
+              <a:rPr lang="fr-FR" sz="2400" dirty="0" smtClean="0"/>
+              <a:t> </a:t>
+            </a:r>
+            <a:r>
+              <a:rPr lang="fr-FR" sz="2400" i="1" dirty="0" err="1" smtClean="0"/>
+              <a:t>xmin</a:t>
+            </a:r>
+            <a:r>
+              <a:rPr lang="fr-FR" sz="2400" dirty="0" smtClean="0"/>
+              <a:t>, double </a:t>
+            </a:r>
+            <a:r>
+              <a:rPr lang="fr-FR" sz="2400" dirty="0" err="1" smtClean="0"/>
+              <a:t>precision</a:t>
+            </a:r>
+            <a:r>
+              <a:rPr lang="fr-FR" sz="2400" dirty="0" smtClean="0"/>
+              <a:t> </a:t>
+            </a:r>
+            <a:r>
+              <a:rPr lang="fr-FR" sz="2400" i="1" dirty="0" err="1" smtClean="0"/>
+              <a:t>ymin</a:t>
+            </a:r>
+            <a:r>
+              <a:rPr lang="fr-FR" sz="2400" dirty="0" smtClean="0"/>
+              <a:t>,</a:t>
+            </a:r>
+          </a:p>
+          <a:p>
+            <a:pPr marL="0" indent="0">
+              <a:buNone/>
+            </a:pPr>
+            <a:r>
+              <a:rPr lang="fr-FR" sz="2400" dirty="0" smtClean="0"/>
+              <a:t> 				double </a:t>
+            </a:r>
+            <a:r>
+              <a:rPr lang="fr-FR" sz="2400" dirty="0" err="1" smtClean="0"/>
+              <a:t>precision</a:t>
+            </a:r>
+            <a:r>
+              <a:rPr lang="fr-FR" sz="2400" dirty="0" smtClean="0"/>
+              <a:t> </a:t>
+            </a:r>
+            <a:r>
+              <a:rPr lang="fr-FR" sz="2400" i="1" dirty="0" err="1" smtClean="0"/>
+              <a:t>xmax</a:t>
+            </a:r>
+            <a:r>
+              <a:rPr lang="fr-FR" sz="2400" dirty="0" smtClean="0"/>
+              <a:t>, double </a:t>
+            </a:r>
+            <a:r>
+              <a:rPr lang="fr-FR" sz="2400" dirty="0" err="1" smtClean="0"/>
+              <a:t>precision</a:t>
+            </a:r>
+            <a:r>
+              <a:rPr lang="fr-FR" sz="2400" dirty="0" smtClean="0"/>
+              <a:t> </a:t>
+            </a:r>
+            <a:r>
+              <a:rPr lang="fr-FR" sz="2400" i="1" dirty="0" err="1" smtClean="0"/>
+              <a:t>ymax</a:t>
+            </a:r>
+            <a:r>
+              <a:rPr lang="fr-FR" sz="2400" dirty="0" smtClean="0"/>
+              <a:t>,</a:t>
+            </a:r>
+          </a:p>
+          <a:p>
+            <a:pPr marL="0" indent="0">
+              <a:buNone/>
+            </a:pPr>
+            <a:r>
+              <a:rPr lang="fr-FR" sz="2400" dirty="0" smtClean="0"/>
+              <a:t> 				</a:t>
+            </a:r>
+            <a:r>
+              <a:rPr lang="fr-FR" sz="2400" dirty="0" err="1" smtClean="0"/>
+              <a:t>integer</a:t>
+            </a:r>
+            <a:r>
+              <a:rPr lang="fr-FR" sz="2400" dirty="0" smtClean="0"/>
+              <a:t> </a:t>
+            </a:r>
+            <a:r>
+              <a:rPr lang="fr-FR" sz="2400" i="1" dirty="0" err="1" smtClean="0"/>
+              <a:t>srid</a:t>
+            </a:r>
+            <a:r>
+              <a:rPr lang="fr-FR" i="1" dirty="0" smtClean="0"/>
+              <a:t>];</a:t>
             </a:r>
             <a:endParaRPr lang="en-GB" dirty="0" smtClean="0"/>
           </a:p>
@@ -8346,22 +8691,29 @@
             </a:pPr>
             <a:r>
               <a:rPr lang="en-GB" dirty="0" smtClean="0"/>
-              <a:t>Output: </a:t>
-            </a:r>
-          </a:p>
-          <a:p>
-            <a:r>
-              <a:rPr lang="en-GB" dirty="0" smtClean="0"/>
               <a:t>Name: </a:t>
             </a:r>
             <a:r>
               <a:rPr lang="en-GB" dirty="0" err="1" smtClean="0"/>
-              <a:t>wkt</a:t>
-            </a:r>
-            <a:r>
-              <a:rPr lang="en-GB" dirty="0" smtClean="0"/>
-              <a:t>		Format: Well Known Text</a:t>
-            </a:r>
+              <a:t>lookupTable</a:t>
+            </a:r>
+            <a:r>
+              <a:rPr lang="en-GB" dirty="0" smtClean="0"/>
+              <a:t>	Format: An array of </a:t>
+            </a:r>
+            <a:r>
+              <a:rPr lang="en-GB" i="1" dirty="0" smtClean="0"/>
+              <a:t>area id </a:t>
+            </a:r>
+            <a:r>
+              <a:rPr lang="en-GB" dirty="0" smtClean="0"/>
+              <a:t>and </a:t>
+            </a:r>
+            <a:r>
+              <a:rPr lang="en-GB" i="1" dirty="0" smtClean="0"/>
+              <a:t>area name 					pairs.</a:t>
+            </a:r>
+            <a:endParaRPr lang="en-GB" dirty="0" smtClean="0"/>
           </a:p>
           <a:p>
             <a:pPr marL="0" indent="0">
@@ -8374,7 +8726,7 @@
     </p:spTree>
     <p:extLst>
       <p:ext uri="{BB962C8B-B14F-4D97-AF65-F5344CB8AC3E}">
-        <p14:creationId xmlns:p14="http://schemas.microsoft.com/office/powerpoint/2010/main" val="2530507387"/>
+        <p14:creationId xmlns:p14="http://schemas.microsoft.com/office/powerpoint/2010/main" val="3026306766"/>
       </p:ext>
     </p:extLst>
   </p:cSld>
@@ -8418,7 +8770,15 @@
           <a:p>
             <a:r>
               <a:rPr lang="en-GB" i="1" dirty="0" err="1" smtClean="0"/>
-              <a:t>createHierarchy</a:t>
+              <a:t>toTopoJSON</a:t>
+            </a:r>
+            <a:r>
+              <a:rPr lang="en-GB" i="1" dirty="0" smtClean="0"/>
+              <a:t> </a:t>
+            </a:r>
+            <a:r>
+              <a:rPr lang="en-GB" dirty="0"/>
+              <a:t>service </a:t>
             </a:r>
             <a:endParaRPr lang="en-GB" dirty="0"/>
           </a:p>
@@ -8444,11 +8804,23 @@
             </a:pPr>
             <a:r>
               <a:rPr lang="en-GB" dirty="0" smtClean="0"/>
-              <a:t>Create hierarchical g</a:t>
-            </a:r>
-            <a:r>
-              <a:rPr lang="en-GB" dirty="0" smtClean="0"/>
-              <a:t>eospatial intersection of all the shapefiles; </a:t>
+              <a:t>Convert </a:t>
+            </a:r>
+            <a:r>
+              <a:rPr lang="en-GB" dirty="0" err="1" smtClean="0"/>
+              <a:t>geoJSON</a:t>
+            </a:r>
+            <a:r>
+              <a:rPr lang="en-GB" dirty="0" smtClean="0"/>
+              <a:t> to </a:t>
+            </a:r>
+            <a:r>
+              <a:rPr lang="en-GB" dirty="0" err="1" smtClean="0"/>
+              <a:t>TopoJSON</a:t>
+            </a:r>
+            <a:r>
+              <a:rPr lang="en-GB" dirty="0" smtClean="0"/>
+              <a:t>;</a:t>
             </a:r>
           </a:p>
           <a:p>
@@ -8457,8 +8829,28 @@
             </a:pPr>
             <a:r>
               <a:rPr lang="en-GB" dirty="0" smtClean="0"/>
-              <a:t>Input: </a:t>
-            </a:r>
+              <a:t>Input fields: </a:t>
+            </a:r>
+            <a:endParaRPr lang="en-GB" dirty="0" smtClean="0"/>
+          </a:p>
+          <a:p>
+            <a:r>
+              <a:rPr lang="en-GB" dirty="0" smtClean="0"/>
+              <a:t>Name: </a:t>
+            </a:r>
+            <a:r>
+              <a:rPr lang="en-GB" dirty="0" err="1" smtClean="0"/>
+              <a:t>Geojson</a:t>
+            </a:r>
+            <a:r>
+              <a:rPr lang="en-GB" dirty="0" smtClean="0"/>
+              <a:t>	Format: </a:t>
+            </a:r>
+            <a:r>
+              <a:rPr lang="en-GB" dirty="0" err="1" smtClean="0"/>
+              <a:t>geoJSON</a:t>
+            </a:r>
+            <a:endParaRPr lang="en-GB" dirty="0" smtClean="0"/>
           </a:p>
           <a:p>
             <a:pPr marL="0" indent="0">
@@ -8466,68 +8858,27 @@
             </a:pPr>
             <a:r>
               <a:rPr lang="en-GB" dirty="0" smtClean="0"/>
+              <a:t>Output JSON: </a:t>
+            </a:r>
+            <a:endParaRPr lang="en-GB" dirty="0" smtClean="0"/>
+          </a:p>
+          <a:p>
+            <a:r>
+              <a:rPr lang="en-GB" dirty="0" smtClean="0"/>
               <a:t>Name: </a:t>
             </a:r>
             <a:r>
               <a:rPr lang="en-GB" dirty="0" err="1" smtClean="0"/>
-              <a:t>sessionId</a:t>
-            </a:r>
-            <a:r>
-              <a:rPr lang="en-GB" dirty="0" smtClean="0"/>
-              <a:t>		Format: HEX string; </a:t>
-            </a:r>
-          </a:p>
-          <a:p>
-            <a:pPr marL="0" indent="0">
-              <a:buNone/>
-            </a:pPr>
-            <a:r>
-              <a:rPr lang="en-GB" dirty="0" smtClean="0"/>
-              <a:t>Output: </a:t>
-            </a:r>
-          </a:p>
-          <a:p>
-            <a:r>
-              <a:rPr lang="en-GB" dirty="0" smtClean="0"/>
-              <a:t>Name: </a:t>
-            </a:r>
-            <a:r>
-              <a:rPr lang="en-GB" dirty="0" err="1" smtClean="0"/>
-              <a:t>hierarchyTable</a:t>
-            </a:r>
-            <a:r>
-              <a:rPr lang="en-GB" dirty="0" smtClean="0"/>
-              <a:t> 	Format: Table of text; column names: </a:t>
-            </a:r>
-          </a:p>
-          <a:p>
-            <a:pPr lvl="1"/>
-            <a:r>
-              <a:rPr lang="en-GB" dirty="0" err="1" smtClean="0"/>
-              <a:t>areaIdColumn</a:t>
-            </a:r>
-            <a:r>
-              <a:rPr lang="en-GB" dirty="0" smtClean="0"/>
-              <a:t> of lowest resolution shapefile … </a:t>
-            </a:r>
-            <a:r>
-              <a:rPr lang="en-GB" dirty="0" err="1" smtClean="0"/>
-              <a:t>areaIdColumn</a:t>
-            </a:r>
-            <a:r>
-              <a:rPr lang="en-GB" dirty="0" smtClean="0"/>
-              <a:t> of highest resolution shapefile, e.g. </a:t>
-            </a:r>
-            <a:r>
-              <a:rPr lang="en-GB" dirty="0" smtClean="0"/>
-              <a:t>coa2011, soa2011, ward2011, ladua2011, gor2011.</a:t>
-            </a:r>
-            <a:endParaRPr lang="en-GB" dirty="0" smtClean="0"/>
-          </a:p>
-          <a:p>
-            <a:pPr marL="0" indent="0">
-              <a:buNone/>
-            </a:pPr>
+              <a:t>topojson</a:t>
+            </a:r>
+            <a:r>
+              <a:rPr lang="en-GB" dirty="0" smtClean="0"/>
+              <a:t>	Format: </a:t>
+            </a:r>
+            <a:r>
+              <a:rPr lang="en-GB" dirty="0" err="1" smtClean="0"/>
+              <a:t>topoJSON</a:t>
+            </a:r>
             <a:endParaRPr lang="en-GB" dirty="0"/>
           </a:p>
         </p:txBody>
@@ -8535,7 +8886,7 @@
     </p:spTree>
     <p:extLst>
       <p:ext uri="{BB962C8B-B14F-4D97-AF65-F5344CB8AC3E}">
-        <p14:creationId xmlns:p14="http://schemas.microsoft.com/office/powerpoint/2010/main" val="3325816122"/>
+        <p14:creationId xmlns:p14="http://schemas.microsoft.com/office/powerpoint/2010/main" val="1029057735"/>
       </p:ext>
     </p:extLst>
   </p:cSld>
@@ -8579,7 +8930,15 @@
           <a:p>
             <a:r>
               <a:rPr lang="en-GB" i="1" dirty="0" err="1" smtClean="0"/>
-              <a:t>createCentroids</a:t>
+              <a:t>GeoJSONtoWKT</a:t>
+            </a:r>
+            <a:r>
+              <a:rPr lang="en-GB" i="1" dirty="0" smtClean="0"/>
+              <a:t> </a:t>
+            </a:r>
+            <a:r>
+              <a:rPr lang="en-GB" dirty="0"/>
+              <a:t>service </a:t>
             </a:r>
             <a:endParaRPr lang="en-GB" dirty="0"/>
           </a:p>
@@ -8597,9 +8956,7 @@
         </p:nvSpPr>
         <p:spPr/>
         <p:txBody>
-          <a:bodyPr>
-            <a:normAutofit lnSpcReduction="10000"/>
-          </a:bodyPr>
+          <a:bodyPr/>
           <a:lstStyle/>
           <a:p>
             <a:pPr marL="0" indent="0">
@@ -8607,7 +8964,15 @@
             </a:pPr>
             <a:r>
               <a:rPr lang="en-GB" dirty="0" smtClean="0"/>
-              <a:t>Create centroids for all shapefiles;</a:t>
+              <a:t>Convert </a:t>
+            </a:r>
+            <a:r>
+              <a:rPr lang="en-GB" dirty="0" err="1" smtClean="0"/>
+              <a:t>geoJSON</a:t>
+            </a:r>
+            <a:r>
+              <a:rPr lang="en-GB" dirty="0" smtClean="0"/>
+              <a:t> to Well Known Text (WKT);</a:t>
             </a:r>
           </a:p>
           <a:p>
@@ -8616,8 +8981,9 @@
             </a:pPr>
             <a:r>
               <a:rPr lang="en-GB" dirty="0" smtClean="0"/>
-              <a:t>Input: </a:t>
-            </a:r>
+              <a:t>Input fields: </a:t>
+            </a:r>
+            <a:endParaRPr lang="en-GB" dirty="0" smtClean="0"/>
           </a:p>
           <a:p>
             <a:r>
@@ -8626,12 +8992,21 @@
             </a:r>
             <a:r>
               <a:rPr lang="en-GB" dirty="0" err="1" smtClean="0"/>
-              <a:t>sessionId</a:t>
-            </a:r>
-            <a:r>
-              <a:rPr lang="en-GB" dirty="0" smtClean="0"/>
-              <a:t>		Format: HEX string; </a:t>
-            </a:r>
+              <a:t>Geojson</a:t>
+            </a:r>
+            <a:r>
+              <a:rPr lang="en-GB" dirty="0" smtClean="0"/>
+              <a:t>	Format: </a:t>
+            </a:r>
+            <a:r>
+              <a:rPr lang="en-GB" dirty="0" err="1" smtClean="0"/>
+              <a:t>geoJSON</a:t>
+            </a:r>
+            <a:r>
+              <a:rPr lang="en-GB" dirty="0" smtClean="0"/>
+              <a:t>;</a:t>
+            </a:r>
+            <a:endParaRPr lang="en-GB" dirty="0" smtClean="0"/>
           </a:p>
           <a:p>
             <a:pPr marL="0" indent="0">
@@ -8639,8 +9014,9 @@
             </a:pPr>
             <a:r>
               <a:rPr lang="en-GB" dirty="0" smtClean="0"/>
-              <a:t>Output: </a:t>
-            </a:r>
+              <a:t>Output JSON: </a:t>
+            </a:r>
+            <a:endParaRPr lang="en-GB" dirty="0" smtClean="0"/>
           </a:p>
           <a:p>
             <a:r>
@@ -8649,90 +9025,17 @@
             </a:r>
             <a:r>
               <a:rPr lang="en-GB" dirty="0" err="1" smtClean="0"/>
-              <a:t>centroidTable</a:t>
-            </a:r>
-            <a:r>
-              <a:rPr lang="en-GB" dirty="0" smtClean="0"/>
-              <a:t> 	Format: Table with column names: </a:t>
-            </a:r>
-          </a:p>
-          <a:p>
-            <a:pPr lvl="1"/>
-            <a:r>
-              <a:rPr lang="en-GB" dirty="0" err="1" smtClean="0"/>
-              <a:t>areaId</a:t>
-            </a:r>
-            <a:r>
-              <a:rPr lang="en-GB" dirty="0" smtClean="0"/>
-              <a:t>:			Area ID	;</a:t>
-            </a:r>
-            <a:endParaRPr lang="en-GB" dirty="0"/>
-          </a:p>
-          <a:p>
-            <a:pPr lvl="1"/>
-            <a:r>
-              <a:rPr lang="en-GB" dirty="0" err="1" smtClean="0"/>
-              <a:t>Xcoordinate</a:t>
-            </a:r>
-            <a:r>
-              <a:rPr lang="en-GB" dirty="0" smtClean="0"/>
-              <a:t>:		Polygonal X co ordinate;</a:t>
-            </a:r>
-          </a:p>
-          <a:p>
-            <a:pPr lvl="1"/>
-            <a:r>
-              <a:rPr lang="en-GB" dirty="0" err="1" smtClean="0"/>
-              <a:t>Y</a:t>
-            </a:r>
-            <a:r>
-              <a:rPr lang="en-GB" dirty="0" err="1" smtClean="0"/>
-              <a:t>Coordinate</a:t>
-            </a:r>
-            <a:r>
-              <a:rPr lang="en-GB" dirty="0" smtClean="0"/>
-              <a:t> :		Polygonal y co ordinate;</a:t>
-            </a:r>
-          </a:p>
-          <a:p>
-            <a:pPr lvl="1"/>
-            <a:r>
-              <a:rPr lang="en-GB" dirty="0" err="1" smtClean="0"/>
-              <a:t>XPopCoordinate</a:t>
-            </a:r>
-            <a:r>
-              <a:rPr lang="en-GB" dirty="0" smtClean="0"/>
-              <a:t>:	</a:t>
-            </a:r>
-            <a:r>
-              <a:rPr lang="en-GB" dirty="0" smtClean="0"/>
-              <a:t>Population weighted </a:t>
-            </a:r>
-            <a:r>
-              <a:rPr lang="en-GB" dirty="0" smtClean="0"/>
-              <a:t>X co ordinate;</a:t>
-            </a:r>
-          </a:p>
-          <a:p>
-            <a:pPr lvl="1"/>
-            <a:r>
-              <a:rPr lang="en-GB" dirty="0" err="1" smtClean="0"/>
-              <a:t>YPopCoordinate</a:t>
-            </a:r>
-            <a:r>
-              <a:rPr lang="en-GB" dirty="0" smtClean="0"/>
-              <a:t> :	Population weighted y co ordinate</a:t>
-            </a:r>
-          </a:p>
-          <a:p>
-            <a:pPr lvl="1"/>
-            <a:endParaRPr lang="en-GB" dirty="0" smtClean="0"/>
-          </a:p>
-          <a:p>
-            <a:pPr lvl="1"/>
-            <a:endParaRPr lang="en-GB" dirty="0" smtClean="0"/>
-          </a:p>
-          <a:p>
+              <a:t>wkt</a:t>
+            </a:r>
+            <a:r>
+              <a:rPr lang="en-GB" dirty="0" smtClean="0"/>
+              <a:t>		Format: Well Known Text</a:t>
+            </a:r>
+          </a:p>
+          <a:p>
+            <a:pPr marL="0" indent="0">
+              <a:buNone/>
+            </a:pPr>
             <a:endParaRPr lang="en-GB" dirty="0"/>
           </a:p>
         </p:txBody>
@@ -8740,7 +9043,7 @@
     </p:spTree>
     <p:extLst>
       <p:ext uri="{BB962C8B-B14F-4D97-AF65-F5344CB8AC3E}">
-        <p14:creationId xmlns:p14="http://schemas.microsoft.com/office/powerpoint/2010/main" val="1010207651"/>
+        <p14:creationId xmlns:p14="http://schemas.microsoft.com/office/powerpoint/2010/main" val="2530507387"/>
       </p:ext>
     </p:extLst>
   </p:cSld>
@@ -8783,14 +9086,18 @@
           <a:lstStyle/>
           <a:p>
             <a:r>
-              <a:rPr lang="en-GB" i="1" dirty="0" err="1"/>
-              <a:t>c</a:t>
-            </a:r>
-            <a:r>
               <a:rPr lang="en-GB" i="1" dirty="0" err="1" smtClean="0"/>
-              <a:t>reateMaptiles</a:t>
-            </a:r>
-            <a:endParaRPr lang="en-GB" i="1" dirty="0"/>
+              <a:t>createHierarchy</a:t>
+            </a:r>
+            <a:r>
+              <a:rPr lang="en-GB" i="1" dirty="0" smtClean="0"/>
+              <a:t> </a:t>
+            </a:r>
+            <a:r>
+              <a:rPr lang="en-GB" dirty="0"/>
+              <a:t>service </a:t>
+            </a:r>
+            <a:endParaRPr lang="en-GB" dirty="0"/>
           </a:p>
         </p:txBody>
       </p:sp>
@@ -8806,9 +9113,7 @@
         </p:nvSpPr>
         <p:spPr/>
         <p:txBody>
-          <a:bodyPr>
-            <a:normAutofit fontScale="85000" lnSpcReduction="20000"/>
-          </a:bodyPr>
+          <a:bodyPr/>
           <a:lstStyle/>
           <a:p>
             <a:pPr marL="0" indent="0">
@@ -8816,39 +9121,7 @@
             </a:pPr>
             <a:r>
               <a:rPr lang="en-GB" dirty="0" smtClean="0"/>
-              <a:t>Create </a:t>
-            </a:r>
-            <a:r>
-              <a:rPr lang="en-GB" dirty="0" err="1" smtClean="0"/>
-              <a:t>topoJSON</a:t>
-            </a:r>
-            <a:r>
-              <a:rPr lang="en-GB" dirty="0" smtClean="0"/>
-              <a:t> </a:t>
-            </a:r>
-            <a:r>
-              <a:rPr lang="en-GB" dirty="0" err="1" smtClean="0"/>
-              <a:t>maptiles</a:t>
-            </a:r>
-            <a:r>
-              <a:rPr lang="en-GB" dirty="0" smtClean="0"/>
-              <a:t> for all </a:t>
-            </a:r>
-            <a:r>
-              <a:rPr lang="en-GB" dirty="0" err="1" smtClean="0"/>
-              <a:t>geolevels</a:t>
-            </a:r>
-            <a:r>
-              <a:rPr lang="en-GB" dirty="0" smtClean="0"/>
-              <a:t> and </a:t>
-            </a:r>
-            <a:r>
-              <a:rPr lang="en-GB" dirty="0" err="1" smtClean="0"/>
-              <a:t>zoomlevels</a:t>
-            </a:r>
-            <a:r>
-              <a:rPr lang="en-GB" dirty="0" smtClean="0"/>
-              <a:t>; </a:t>
+              <a:t>Create hierarchical geospatial intersection of all the shapefiles; </a:t>
             </a:r>
           </a:p>
           <a:p>
@@ -8857,10 +9130,14 @@
             </a:pPr>
             <a:r>
               <a:rPr lang="en-GB" dirty="0" smtClean="0"/>
-              <a:t>Input: </a:t>
-            </a:r>
-          </a:p>
-          <a:p>
+              <a:t>Input fields: </a:t>
+            </a:r>
+            <a:endParaRPr lang="en-GB" dirty="0" smtClean="0"/>
+          </a:p>
+          <a:p>
+            <a:pPr marL="0" indent="0">
+              <a:buNone/>
+            </a:pPr>
             <a:r>
               <a:rPr lang="en-GB" dirty="0" smtClean="0"/>
               <a:t>Name: </a:t>
@@ -8880,8 +9157,9 @@
             </a:pPr>
             <a:r>
               <a:rPr lang="en-GB" dirty="0" smtClean="0"/>
-              <a:t>Output: </a:t>
-            </a:r>
+              <a:t>Output JSON: </a:t>
+            </a:r>
+            <a:endParaRPr lang="en-GB" dirty="0" smtClean="0"/>
           </a:p>
           <a:p>
             <a:r>
@@ -8890,153 +9168,31 @@
             </a:r>
             <a:r>
               <a:rPr lang="en-GB" dirty="0" err="1" smtClean="0"/>
-              <a:t>mapTileTable</a:t>
-            </a:r>
-            <a:r>
-              <a:rPr lang="en-GB" dirty="0" smtClean="0"/>
-              <a:t> 	Format: Table with column names: </a:t>
+              <a:t>hierarchyTable</a:t>
+            </a:r>
+            <a:r>
+              <a:rPr lang="en-GB" dirty="0" smtClean="0"/>
+              <a:t> 	Format: Table of text; column names: </a:t>
             </a:r>
           </a:p>
           <a:p>
             <a:pPr lvl="1"/>
             <a:r>
               <a:rPr lang="en-GB" dirty="0" err="1" smtClean="0"/>
-              <a:t>shapefileBaseName</a:t>
-            </a:r>
-            <a:r>
-              <a:rPr lang="en-GB" dirty="0" smtClean="0"/>
-              <a:t>:	Name of </a:t>
-            </a:r>
-            <a:r>
-              <a:rPr lang="en-GB" dirty="0" err="1" smtClean="0"/>
-              <a:t>geolevel</a:t>
-            </a:r>
-            <a:r>
-              <a:rPr lang="en-GB" dirty="0" smtClean="0"/>
-              <a:t>;</a:t>
-            </a:r>
-          </a:p>
-          <a:p>
-            <a:pPr lvl="1"/>
-            <a:r>
-              <a:rPr lang="en-GB" dirty="0" err="1" smtClean="0"/>
-              <a:t>Zoomlevel</a:t>
-            </a:r>
-            <a:r>
-              <a:rPr lang="en-GB" dirty="0" smtClean="0"/>
-              <a:t>:			</a:t>
-            </a:r>
-            <a:r>
-              <a:rPr lang="en-GB" dirty="0" err="1" smtClean="0"/>
-              <a:t>Zoomlevel</a:t>
-            </a:r>
-            <a:r>
-              <a:rPr lang="en-GB" dirty="0" smtClean="0"/>
-              <a:t> (0-max </a:t>
-            </a:r>
-            <a:r>
-              <a:rPr lang="en-GB" dirty="0" err="1" smtClean="0"/>
-              <a:t>zoomlevel</a:t>
-            </a:r>
-            <a:r>
-              <a:rPr lang="en-GB" dirty="0" smtClean="0"/>
-              <a:t>, default: 11, maximum: 19);</a:t>
-            </a:r>
-          </a:p>
-          <a:p>
-            <a:pPr lvl="1"/>
-            <a:r>
-              <a:rPr lang="en-GB" dirty="0" err="1" smtClean="0"/>
-              <a:t>geolevelId</a:t>
-            </a:r>
-            <a:r>
-              <a:rPr lang="en-GB" dirty="0" smtClean="0"/>
-              <a:t>:			Numeric </a:t>
-            </a:r>
-            <a:r>
-              <a:rPr lang="en-GB" dirty="0" err="1" smtClean="0"/>
-              <a:t>geoLevel</a:t>
-            </a:r>
-            <a:r>
-              <a:rPr lang="en-GB" dirty="0" smtClean="0"/>
-              <a:t> after hierarchy created (1-number of 					shapefiles); </a:t>
-            </a:r>
-          </a:p>
-          <a:p>
-            <a:pPr lvl="1"/>
-            <a:r>
-              <a:rPr lang="en-GB" dirty="0" err="1" smtClean="0"/>
-              <a:t>numTiles</a:t>
-            </a:r>
-            <a:r>
-              <a:rPr lang="en-GB" dirty="0" smtClean="0"/>
-              <a:t>:			Number of tiles in </a:t>
-            </a:r>
-            <a:r>
-              <a:rPr lang="en-GB" dirty="0" err="1" smtClean="0"/>
-              <a:t>zoomlevel</a:t>
-            </a:r>
-            <a:r>
-              <a:rPr lang="en-GB" dirty="0" smtClean="0"/>
-              <a:t> and </a:t>
-            </a:r>
-            <a:r>
-              <a:rPr lang="en-GB" dirty="0" err="1" smtClean="0"/>
-              <a:t>geolevel</a:t>
-            </a:r>
-            <a:r>
-              <a:rPr lang="en-GB" dirty="0" smtClean="0"/>
-              <a:t>;</a:t>
-            </a:r>
-            <a:endParaRPr lang="en-GB" dirty="0" smtClean="0"/>
-          </a:p>
-          <a:p>
-            <a:pPr lvl="1"/>
-            <a:r>
-              <a:rPr lang="en-GB" dirty="0" err="1" smtClean="0"/>
-              <a:t>minX</a:t>
-            </a:r>
-            <a:r>
-              <a:rPr lang="en-GB" dirty="0" smtClean="0"/>
-              <a:t>:			Minimum X tile number;</a:t>
-            </a:r>
-          </a:p>
-          <a:p>
-            <a:pPr lvl="1"/>
-            <a:r>
-              <a:rPr lang="en-GB" dirty="0" err="1" smtClean="0"/>
-              <a:t>maxX</a:t>
-            </a:r>
-            <a:r>
-              <a:rPr lang="en-GB" dirty="0" smtClean="0"/>
-              <a:t>:			Maximum X tile number;</a:t>
-            </a:r>
-          </a:p>
-          <a:p>
-            <a:pPr lvl="1"/>
-            <a:r>
-              <a:rPr lang="en-GB" dirty="0" err="1" smtClean="0"/>
-              <a:t>minY</a:t>
-            </a:r>
-            <a:r>
-              <a:rPr lang="en-GB" dirty="0" smtClean="0"/>
-              <a:t>:			Minimum Y tile number;</a:t>
-            </a:r>
-          </a:p>
-          <a:p>
-            <a:pPr lvl="1"/>
-            <a:r>
-              <a:rPr lang="en-GB" dirty="0" err="1" smtClean="0"/>
-              <a:t>maxY</a:t>
-            </a:r>
-            <a:r>
-              <a:rPr lang="en-GB" dirty="0" smtClean="0"/>
-              <a:t>:			Maximum Y tile number;</a:t>
-            </a:r>
-          </a:p>
-          <a:p>
-            <a:pPr lvl="1"/>
-            <a:endParaRPr lang="en-GB" dirty="0" smtClean="0"/>
+              <a:t>areaIdColumn</a:t>
+            </a:r>
+            <a:r>
+              <a:rPr lang="en-GB" dirty="0" smtClean="0"/>
+              <a:t> of lowest resolution shapefile … </a:t>
+            </a:r>
+            <a:r>
+              <a:rPr lang="en-GB" dirty="0" err="1" smtClean="0"/>
+              <a:t>areaIdColumn</a:t>
+            </a:r>
+            <a:r>
+              <a:rPr lang="en-GB" dirty="0" smtClean="0"/>
+              <a:t> of highest resolution shapefile, e.g. coa2011, soa2011, ward2011, ladua2011, gor2011.</a:t>
+            </a:r>
           </a:p>
           <a:p>
             <a:pPr marL="0" indent="0">
@@ -9049,7 +9205,7 @@
     </p:spTree>
     <p:extLst>
       <p:ext uri="{BB962C8B-B14F-4D97-AF65-F5344CB8AC3E}">
-        <p14:creationId xmlns:p14="http://schemas.microsoft.com/office/powerpoint/2010/main" val="3397597598"/>
+        <p14:creationId xmlns:p14="http://schemas.microsoft.com/office/powerpoint/2010/main" val="3325816122"/>
       </p:ext>
     </p:extLst>
   </p:cSld>
@@ -9232,8 +9388,16 @@
           <a:lstStyle/>
           <a:p>
             <a:r>
-              <a:rPr lang="en-GB" dirty="0" err="1" smtClean="0"/>
-              <a:t>GetGeospatialData</a:t>
+              <a:rPr lang="en-GB" i="1" dirty="0" err="1" smtClean="0"/>
+              <a:t>createCentroids</a:t>
+            </a:r>
+            <a:r>
+              <a:rPr lang="en-GB" i="1" dirty="0" smtClean="0"/>
+              <a:t> </a:t>
+            </a:r>
+            <a:r>
+              <a:rPr lang="en-GB" dirty="0"/>
+              <a:t>service </a:t>
             </a:r>
             <a:endParaRPr lang="en-GB" dirty="0"/>
           </a:p>
@@ -9252,23 +9416,27 @@
         <p:spPr/>
         <p:txBody>
           <a:bodyPr>
-            <a:normAutofit/>
+            <a:normAutofit fontScale="62500" lnSpcReduction="20000"/>
           </a:bodyPr>
           <a:lstStyle/>
           <a:p>
-            <a:r>
-              <a:rPr lang="en-GB" dirty="0" smtClean="0"/>
-              <a:t>Normally called after all other processing is completed, one data set per original shapefile;</a:t>
-            </a:r>
-          </a:p>
-          <a:p>
             <a:pPr marL="0" indent="0">
               <a:buNone/>
             </a:pPr>
             <a:r>
               <a:rPr lang="en-GB" dirty="0" smtClean="0"/>
-              <a:t>Input: </a:t>
-            </a:r>
+              <a:t>Create centroids for all shapefiles;</a:t>
+            </a:r>
+          </a:p>
+          <a:p>
+            <a:pPr marL="0" indent="0">
+              <a:buNone/>
+            </a:pPr>
+            <a:r>
+              <a:rPr lang="en-GB" dirty="0" smtClean="0"/>
+              <a:t>Input fields: </a:t>
+            </a:r>
+            <a:endParaRPr lang="en-GB" dirty="0" smtClean="0"/>
           </a:p>
           <a:p>
             <a:r>
@@ -9281,8 +9449,9 @@
             </a:r>
             <a:r>
               <a:rPr lang="en-GB" dirty="0" smtClean="0"/>
-              <a:t>			Format: HEX string; </a:t>
-            </a:r>
+              <a:t>		Format: HEX string; </a:t>
+            </a:r>
+            <a:endParaRPr lang="en-GB" dirty="0" smtClean="0"/>
           </a:p>
           <a:p>
             <a:r>
@@ -9291,28 +9460,143 @@
             </a:r>
             <a:r>
               <a:rPr lang="en-GB" dirty="0" err="1" smtClean="0"/>
-              <a:t>shapefileBaseName</a:t>
-            </a:r>
-            <a:r>
-              <a:rPr lang="en-GB" dirty="0" smtClean="0"/>
-              <a:t>	Format: Valid database column name, 					name of </a:t>
-            </a:r>
-            <a:r>
-              <a:rPr lang="en-GB" dirty="0" err="1" smtClean="0"/>
-              <a:t>geolevel</a:t>
-            </a:r>
-            <a:r>
-              <a:rPr lang="en-GB" dirty="0"/>
-              <a:t> </a:t>
-            </a:r>
-            <a:r>
-              <a:rPr lang="en-GB" dirty="0" smtClean="0"/>
-              <a:t>and also of </a:t>
-            </a:r>
-            <a:r>
-              <a:rPr lang="en-GB" dirty="0" smtClean="0"/>
-              <a:t>original 						shapefile;</a:t>
-            </a:r>
+              <a:t>hasHeader</a:t>
+            </a:r>
+            <a:r>
+              <a:rPr lang="en-GB" dirty="0" smtClean="0"/>
+              <a:t>	Format: true/false (as text)</a:t>
+            </a:r>
+          </a:p>
+          <a:p>
+            <a:r>
+              <a:rPr lang="en-GB" dirty="0" smtClean="0"/>
+              <a:t>Name: Header		Format: JSON array, default [</a:t>
+            </a:r>
+            <a:r>
+              <a:rPr lang="en-GB" dirty="0" err="1" smtClean="0"/>
+              <a:t>areaId,males,females</a:t>
+            </a:r>
+            <a:r>
+              <a:rPr lang="en-GB" dirty="0" smtClean="0"/>
+              <a:t>]; names must be as per 				default. </a:t>
+            </a:r>
+            <a:endParaRPr lang="en-GB" dirty="0"/>
+          </a:p>
+          <a:p>
+            <a:pPr marL="0" indent="0">
+              <a:buNone/>
+            </a:pPr>
+            <a:r>
+              <a:rPr lang="en-GB" dirty="0" smtClean="0"/>
+              <a:t>Optional input file:</a:t>
+            </a:r>
+          </a:p>
+          <a:p>
+            <a:r>
+              <a:rPr lang="en-GB" dirty="0" smtClean="0"/>
+              <a:t>.csv</a:t>
+            </a:r>
+            <a:r>
+              <a:rPr lang="en-GB" dirty="0" smtClean="0"/>
+              <a:t>: Male and female population by </a:t>
+            </a:r>
+            <a:r>
+              <a:rPr lang="en-GB" dirty="0" err="1" smtClean="0"/>
+              <a:t>area_id</a:t>
+            </a:r>
+            <a:r>
+              <a:rPr lang="en-GB" dirty="0" smtClean="0"/>
+              <a:t>. No header: assume area ID, total males, total females</a:t>
+            </a:r>
+            <a:endParaRPr lang="en-GB" dirty="0" smtClean="0"/>
+          </a:p>
+          <a:p>
+            <a:pPr marL="0" indent="0">
+              <a:buNone/>
+            </a:pPr>
+            <a:r>
+              <a:rPr lang="en-GB" dirty="0" smtClean="0"/>
+              <a:t>Output JSON: </a:t>
+            </a:r>
+            <a:endParaRPr lang="en-GB" dirty="0" smtClean="0"/>
+          </a:p>
+          <a:p>
+            <a:r>
+              <a:rPr lang="en-GB" dirty="0" smtClean="0"/>
+              <a:t>Name: </a:t>
+            </a:r>
+            <a:r>
+              <a:rPr lang="en-GB" dirty="0" err="1" smtClean="0"/>
+              <a:t>centroidTable</a:t>
+            </a:r>
+            <a:r>
+              <a:rPr lang="en-GB" dirty="0" smtClean="0"/>
+              <a:t> 	Format: Table with column names: </a:t>
+            </a:r>
+          </a:p>
+          <a:p>
+            <a:pPr lvl="1"/>
+            <a:r>
+              <a:rPr lang="en-GB" dirty="0" err="1" smtClean="0"/>
+              <a:t>areaId</a:t>
+            </a:r>
+            <a:r>
+              <a:rPr lang="en-GB" dirty="0" smtClean="0"/>
+              <a:t>:		</a:t>
+            </a:r>
+            <a:r>
+              <a:rPr lang="en-GB" dirty="0" smtClean="0"/>
+              <a:t>Area ID;</a:t>
+            </a:r>
+            <a:endParaRPr lang="en-GB" dirty="0"/>
+          </a:p>
+          <a:p>
+            <a:pPr lvl="1"/>
+            <a:r>
+              <a:rPr lang="en-GB" dirty="0" err="1" smtClean="0"/>
+              <a:t>Xcoordinate</a:t>
+            </a:r>
+            <a:r>
+              <a:rPr lang="en-GB" dirty="0" smtClean="0"/>
+              <a:t>:		Polygonal X co ordinate;</a:t>
+            </a:r>
+          </a:p>
+          <a:p>
+            <a:pPr lvl="1"/>
+            <a:r>
+              <a:rPr lang="en-GB" dirty="0" err="1" smtClean="0"/>
+              <a:t>YCoordinate</a:t>
+            </a:r>
+            <a:r>
+              <a:rPr lang="en-GB" dirty="0" smtClean="0"/>
+              <a:t> :		Polygonal y co ordinate;</a:t>
+            </a:r>
+          </a:p>
+          <a:p>
+            <a:pPr lvl="1"/>
+            <a:r>
+              <a:rPr lang="en-GB" dirty="0" err="1" smtClean="0"/>
+              <a:t>XPopCoordinate</a:t>
+            </a:r>
+            <a:r>
+              <a:rPr lang="en-GB" dirty="0" smtClean="0"/>
+              <a:t>:	Population weighted X co ordinate;</a:t>
+            </a:r>
+          </a:p>
+          <a:p>
+            <a:pPr lvl="1"/>
+            <a:r>
+              <a:rPr lang="en-GB" dirty="0" err="1" smtClean="0"/>
+              <a:t>YPopCoordinate</a:t>
+            </a:r>
+            <a:r>
+              <a:rPr lang="en-GB" dirty="0" smtClean="0"/>
+              <a:t> :	Population weighted y co ordinate</a:t>
+            </a:r>
+          </a:p>
+          <a:p>
+            <a:pPr lvl="1"/>
+            <a:endParaRPr lang="en-GB" dirty="0" smtClean="0"/>
           </a:p>
           <a:p>
             <a:pPr lvl="1"/>
@@ -9326,7 +9610,7 @@
     </p:spTree>
     <p:extLst>
       <p:ext uri="{BB962C8B-B14F-4D97-AF65-F5344CB8AC3E}">
-        <p14:creationId xmlns:p14="http://schemas.microsoft.com/office/powerpoint/2010/main" val="2207147806"/>
+        <p14:creationId xmlns:p14="http://schemas.microsoft.com/office/powerpoint/2010/main" val="1010207651"/>
       </p:ext>
     </p:extLst>
   </p:cSld>
@@ -9369,14 +9653,18 @@
           <a:lstStyle/>
           <a:p>
             <a:r>
-              <a:rPr lang="en-GB" dirty="0" err="1" smtClean="0"/>
-              <a:t>GetGeospatialData</a:t>
-            </a:r>
-            <a:r>
-              <a:rPr lang="en-GB" dirty="0" smtClean="0"/>
-              <a:t> (2)</a:t>
-            </a:r>
-            <a:endParaRPr lang="en-GB" dirty="0"/>
+              <a:rPr lang="en-GB" i="1" dirty="0" err="1" smtClean="0"/>
+              <a:t>createMaptiles</a:t>
+            </a:r>
+            <a:r>
+              <a:rPr lang="en-GB" i="1" dirty="0" smtClean="0"/>
+              <a:t> </a:t>
+            </a:r>
+            <a:r>
+              <a:rPr lang="en-GB" dirty="0"/>
+              <a:t>service </a:t>
+            </a:r>
+            <a:endParaRPr lang="en-GB" i="1" dirty="0"/>
           </a:p>
         </p:txBody>
       </p:sp>
@@ -9393,7 +9681,7 @@
         <p:spPr/>
         <p:txBody>
           <a:bodyPr>
-            <a:normAutofit fontScale="92500"/>
+            <a:normAutofit fontScale="85000" lnSpcReduction="20000"/>
           </a:bodyPr>
           <a:lstStyle/>
           <a:p>
@@ -9402,49 +9690,125 @@
             </a:pPr>
             <a:r>
               <a:rPr lang="en-GB" dirty="0" smtClean="0"/>
-              <a:t>Output: </a:t>
+              <a:t>Create </a:t>
+            </a:r>
+            <a:r>
+              <a:rPr lang="en-GB" dirty="0" err="1" smtClean="0"/>
+              <a:t>topoJSON</a:t>
+            </a:r>
+            <a:r>
+              <a:rPr lang="en-GB" dirty="0" smtClean="0"/>
+              <a:t> </a:t>
+            </a:r>
+            <a:r>
+              <a:rPr lang="en-GB" dirty="0" err="1" smtClean="0"/>
+              <a:t>maptiles</a:t>
+            </a:r>
+            <a:r>
+              <a:rPr lang="en-GB" dirty="0" smtClean="0"/>
+              <a:t> for all </a:t>
+            </a:r>
+            <a:r>
+              <a:rPr lang="en-GB" dirty="0" err="1" smtClean="0"/>
+              <a:t>geolevels</a:t>
+            </a:r>
+            <a:r>
+              <a:rPr lang="en-GB" dirty="0" smtClean="0"/>
+              <a:t> and </a:t>
+            </a:r>
+            <a:r>
+              <a:rPr lang="en-GB" dirty="0" err="1" smtClean="0"/>
+              <a:t>zoomlevels</a:t>
+            </a:r>
+            <a:r>
+              <a:rPr lang="en-GB" dirty="0" smtClean="0"/>
+              <a:t>; </a:t>
+            </a:r>
+          </a:p>
+          <a:p>
+            <a:pPr marL="0" indent="0">
+              <a:buNone/>
+            </a:pPr>
+            <a:r>
+              <a:rPr lang="en-GB" dirty="0" smtClean="0"/>
+              <a:t>Input fields: </a:t>
+            </a:r>
+            <a:endParaRPr lang="en-GB" dirty="0" smtClean="0"/>
+          </a:p>
+          <a:p>
+            <a:r>
+              <a:rPr lang="en-GB" dirty="0" smtClean="0"/>
+              <a:t>Name: </a:t>
+            </a:r>
+            <a:r>
+              <a:rPr lang="en-GB" dirty="0" err="1" smtClean="0"/>
+              <a:t>sessionId</a:t>
+            </a:r>
+            <a:r>
+              <a:rPr lang="en-GB" dirty="0" smtClean="0"/>
+              <a:t>		Format: HEX string; </a:t>
+            </a:r>
+          </a:p>
+          <a:p>
+            <a:pPr marL="0" indent="0">
+              <a:buNone/>
+            </a:pPr>
+            <a:r>
+              <a:rPr lang="en-GB" dirty="0" smtClean="0"/>
+              <a:t>Output JSON: </a:t>
+            </a:r>
+            <a:endParaRPr lang="en-GB" dirty="0" smtClean="0"/>
+          </a:p>
+          <a:p>
+            <a:r>
+              <a:rPr lang="en-GB" dirty="0" smtClean="0"/>
+              <a:t>Name: </a:t>
+            </a:r>
+            <a:r>
+              <a:rPr lang="en-GB" dirty="0" err="1" smtClean="0"/>
+              <a:t>mapTileTable</a:t>
+            </a:r>
+            <a:r>
+              <a:rPr lang="en-GB" dirty="0" smtClean="0"/>
+              <a:t> 	Format: Table with column names: </a:t>
             </a:r>
           </a:p>
           <a:p>
             <a:pPr lvl="1"/>
             <a:r>
-              <a:rPr lang="en-GB" dirty="0" smtClean="0"/>
-              <a:t>Cleaned and valid original data as </a:t>
-            </a:r>
-            <a:r>
-              <a:rPr lang="en-GB" dirty="0" err="1" smtClean="0"/>
-              <a:t>geoJSON</a:t>
-            </a:r>
-            <a:r>
-              <a:rPr lang="en-GB" dirty="0" smtClean="0"/>
-              <a:t> (</a:t>
-            </a:r>
-            <a:r>
-              <a:rPr lang="en-GB" dirty="0" err="1" smtClean="0"/>
-              <a:t>ShapefileGeoJSon</a:t>
-            </a:r>
-            <a:r>
-              <a:rPr lang="en-GB" dirty="0" smtClean="0"/>
-              <a:t>) and Well Known Text (</a:t>
-            </a:r>
-            <a:r>
-              <a:rPr lang="en-GB" dirty="0" err="1" smtClean="0"/>
-              <a:t>ShapefileWkt</a:t>
-            </a:r>
-            <a:r>
-              <a:rPr lang="en-GB" dirty="0" smtClean="0"/>
-              <a:t>);</a:t>
+              <a:rPr lang="en-GB" dirty="0" err="1" smtClean="0"/>
+              <a:t>shapefileBaseName</a:t>
+            </a:r>
+            <a:r>
+              <a:rPr lang="en-GB" dirty="0" smtClean="0"/>
+              <a:t>:	Name of </a:t>
+            </a:r>
+            <a:r>
+              <a:rPr lang="en-GB" dirty="0" err="1" smtClean="0"/>
+              <a:t>geolevel</a:t>
+            </a:r>
+            <a:r>
+              <a:rPr lang="en-GB" dirty="0" smtClean="0"/>
+              <a:t>;</a:t>
             </a:r>
           </a:p>
           <a:p>
             <a:pPr lvl="1"/>
             <a:r>
               <a:rPr lang="en-GB" dirty="0" err="1" smtClean="0"/>
-              <a:t>OptimisedGeojsonZoomlevel</a:t>
-            </a:r>
-            <a:r>
-              <a:rPr lang="en-GB" dirty="0" smtClean="0"/>
-              <a:t>&lt;</a:t>
+              <a:t>Zoomlevel</a:t>
+            </a:r>
+            <a:r>
+              <a:rPr lang="en-GB" dirty="0" smtClean="0"/>
+              <a:t>:			</a:t>
+            </a:r>
+            <a:r>
+              <a:rPr lang="en-GB" dirty="0" err="1" smtClean="0"/>
+              <a:t>Zoomlevel</a:t>
+            </a:r>
+            <a:r>
+              <a:rPr lang="en-GB" dirty="0" smtClean="0"/>
+              <a:t> (0-max </a:t>
             </a:r>
             <a:r>
               <a:rPr lang="en-GB" dirty="0" err="1" smtClean="0"/>
@@ -9452,15 +9816,37 @@
             </a:r>
             <a:r>
               <a:rPr lang="en-GB" dirty="0" smtClean="0"/>
-              <a:t>&gt;, </a:t>
-            </a:r>
-            <a:r>
-              <a:rPr lang="en-GB" dirty="0" err="1" smtClean="0"/>
-              <a:t>OptimisedWktZoomlevel</a:t>
-            </a:r>
-            <a:r>
-              <a:rPr lang="en-GB" dirty="0" smtClean="0"/>
-              <a:t>&lt;</a:t>
+              <a:t>, default: 11, maximum: 19);</a:t>
+            </a:r>
+          </a:p>
+          <a:p>
+            <a:pPr lvl="1"/>
+            <a:r>
+              <a:rPr lang="en-GB" dirty="0" err="1" smtClean="0"/>
+              <a:t>geolevelId</a:t>
+            </a:r>
+            <a:r>
+              <a:rPr lang="en-GB" dirty="0" smtClean="0"/>
+              <a:t>:			Numeric </a:t>
+            </a:r>
+            <a:r>
+              <a:rPr lang="en-GB" dirty="0" err="1" smtClean="0"/>
+              <a:t>geoLevel</a:t>
+            </a:r>
+            <a:r>
+              <a:rPr lang="en-GB" dirty="0" smtClean="0"/>
+              <a:t> after hierarchy created (1-number of 					shapefiles); </a:t>
+            </a:r>
+          </a:p>
+          <a:p>
+            <a:pPr lvl="1"/>
+            <a:r>
+              <a:rPr lang="en-GB" dirty="0" err="1" smtClean="0"/>
+              <a:t>numTiles</a:t>
+            </a:r>
+            <a:r>
+              <a:rPr lang="en-GB" dirty="0" smtClean="0"/>
+              <a:t>:			Number of tiles in </a:t>
             </a:r>
             <a:r>
               <a:rPr lang="en-GB" dirty="0" err="1" smtClean="0"/>
@@ -9468,135 +9854,63 @@
             </a:r>
             <a:r>
               <a:rPr lang="en-GB" dirty="0" smtClean="0"/>
-              <a:t>&gt;: Simplified data as </a:t>
-            </a:r>
-            <a:r>
-              <a:rPr lang="en-GB" dirty="0" err="1" smtClean="0"/>
-              <a:t>geoJSON</a:t>
-            </a:r>
-            <a:r>
-              <a:rPr lang="en-GB" dirty="0" smtClean="0"/>
-              <a:t> and Well Known Text (WKT);</a:t>
+              <a:t> and </a:t>
+            </a:r>
+            <a:r>
+              <a:rPr lang="en-GB" dirty="0" err="1" smtClean="0"/>
+              <a:t>geolevel</a:t>
+            </a:r>
+            <a:r>
+              <a:rPr lang="en-GB" dirty="0" smtClean="0"/>
+              <a:t>;</a:t>
             </a:r>
           </a:p>
           <a:p>
             <a:pPr lvl="1"/>
             <a:r>
-              <a:rPr lang="en-GB" i="1" dirty="0" err="1" smtClean="0"/>
-              <a:t>GeolevelId</a:t>
-            </a:r>
-            <a:r>
-              <a:rPr lang="en-GB" i="1" dirty="0" smtClean="0"/>
-              <a:t>: </a:t>
-            </a:r>
-            <a:r>
-              <a:rPr lang="en-GB" i="1" dirty="0" err="1" smtClean="0"/>
-              <a:t>Geolevel</a:t>
-            </a:r>
-            <a:r>
-              <a:rPr lang="en-GB" i="1" dirty="0" smtClean="0"/>
-              <a:t> ID </a:t>
-            </a:r>
-            <a:r>
-              <a:rPr lang="en-GB" dirty="0" smtClean="0"/>
-              <a:t>(1 to max shapefiles in set)</a:t>
-            </a:r>
-            <a:r>
-              <a:rPr lang="en-GB" i="1" dirty="0" smtClean="0"/>
-              <a:t> </a:t>
-            </a:r>
-            <a:r>
-              <a:rPr lang="en-GB" dirty="0" smtClean="0"/>
-              <a:t>if hierarchical intersection created;</a:t>
+              <a:rPr lang="en-GB" dirty="0" err="1" smtClean="0"/>
+              <a:t>minX</a:t>
+            </a:r>
+            <a:r>
+              <a:rPr lang="en-GB" dirty="0" smtClean="0"/>
+              <a:t>:			Minimum X tile number;</a:t>
             </a:r>
           </a:p>
           <a:p>
             <a:pPr lvl="1"/>
             <a:r>
-              <a:rPr lang="en-GB" smtClean="0"/>
-              <a:t>ShapefileMetadata</a:t>
-            </a:r>
-            <a:r>
-              <a:rPr lang="en-GB" dirty="0" smtClean="0"/>
-              <a:t>: Shapefile </a:t>
-            </a:r>
-            <a:r>
-              <a:rPr lang="en-GB" i="1" dirty="0" smtClean="0"/>
-              <a:t>XML metadata in JSON format </a:t>
-            </a:r>
-            <a:r>
-              <a:rPr lang="en-GB" dirty="0" smtClean="0"/>
-              <a:t>if present;</a:t>
+              <a:rPr lang="en-GB" dirty="0" err="1" smtClean="0"/>
+              <a:t>maxX</a:t>
+            </a:r>
+            <a:r>
+              <a:rPr lang="en-GB" dirty="0" smtClean="0"/>
+              <a:t>:			Maximum X tile number;</a:t>
             </a:r>
           </a:p>
           <a:p>
             <a:pPr lvl="1"/>
             <a:r>
-              <a:rPr lang="en-GB" dirty="0" smtClean="0"/>
-              <a:t>Projection: Original projection; </a:t>
+              <a:rPr lang="en-GB" dirty="0" err="1" smtClean="0"/>
+              <a:t>minY</a:t>
+            </a:r>
+            <a:r>
+              <a:rPr lang="en-GB" dirty="0" smtClean="0"/>
+              <a:t>:			Minimum Y tile number;</a:t>
             </a:r>
           </a:p>
           <a:p>
             <a:pPr lvl="1"/>
             <a:r>
               <a:rPr lang="en-GB" dirty="0" err="1" smtClean="0"/>
-              <a:t>Srid</a:t>
-            </a:r>
-            <a:r>
-              <a:rPr lang="en-GB" dirty="0" smtClean="0"/>
-              <a:t>: SRID</a:t>
-            </a:r>
-            <a:endParaRPr lang="en-GB" dirty="0" smtClean="0"/>
+              <a:t>maxY</a:t>
+            </a:r>
+            <a:r>
+              <a:rPr lang="en-GB" dirty="0" smtClean="0"/>
+              <a:t>:			Maximum Y tile number;</a:t>
+            </a:r>
           </a:p>
           <a:p>
             <a:pPr lvl="1"/>
-            <a:r>
-              <a:rPr lang="en-GB" dirty="0" err="1" smtClean="0"/>
-              <a:t>AreaId</a:t>
-            </a:r>
-            <a:r>
-              <a:rPr lang="en-GB" dirty="0" smtClean="0"/>
-              <a:t>, </a:t>
-            </a:r>
-            <a:r>
-              <a:rPr lang="en-GB" dirty="0" err="1" smtClean="0"/>
-              <a:t>AreaName</a:t>
-            </a:r>
-            <a:r>
-              <a:rPr lang="en-GB" dirty="0" smtClean="0"/>
-              <a:t>: </a:t>
-            </a:r>
-            <a:r>
-              <a:rPr lang="en-GB" i="1" dirty="0" smtClean="0"/>
-              <a:t>area id </a:t>
-            </a:r>
-            <a:r>
-              <a:rPr lang="en-GB" dirty="0" smtClean="0"/>
-              <a:t>and </a:t>
-            </a:r>
-            <a:r>
-              <a:rPr lang="en-GB" i="1" dirty="0" smtClean="0"/>
-              <a:t>area name </a:t>
-            </a:r>
-            <a:r>
-              <a:rPr lang="en-GB" dirty="0" smtClean="0"/>
-              <a:t>field data;</a:t>
-            </a:r>
-          </a:p>
-          <a:p>
-            <a:pPr lvl="1"/>
-            <a:r>
-              <a:rPr lang="en-GB" dirty="0" smtClean="0"/>
-              <a:t>Polygonal and population weighted centroids (see: </a:t>
-            </a:r>
-            <a:r>
-              <a:rPr lang="en-GB" i="1" dirty="0" err="1" smtClean="0"/>
-              <a:t>createCentroids</a:t>
-            </a:r>
-            <a:r>
-              <a:rPr lang="en-GB" i="1" dirty="0" smtClean="0"/>
-              <a:t>)</a:t>
-            </a:r>
             <a:endParaRPr lang="en-GB" dirty="0" smtClean="0"/>
           </a:p>
           <a:p>
@@ -9610,7 +9924,7 @@
     </p:spTree>
     <p:extLst>
       <p:ext uri="{BB962C8B-B14F-4D97-AF65-F5344CB8AC3E}">
-        <p14:creationId xmlns:p14="http://schemas.microsoft.com/office/powerpoint/2010/main" val="3775498934"/>
+        <p14:creationId xmlns:p14="http://schemas.microsoft.com/office/powerpoint/2010/main" val="3397597598"/>
       </p:ext>
     </p:extLst>
   </p:cSld>
@@ -9653,8 +9967,16 @@
           <a:lstStyle/>
           <a:p>
             <a:r>
-              <a:rPr lang="en-GB" dirty="0" err="1" smtClean="0"/>
-              <a:t>getNumShapefilesInSet</a:t>
+              <a:rPr lang="en-GB" i="1" dirty="0" err="1" smtClean="0"/>
+              <a:t>g</a:t>
+            </a:r>
+            <a:r>
+              <a:rPr lang="en-GB" i="1" dirty="0" err="1" smtClean="0"/>
+              <a:t>etGeospatialData</a:t>
+            </a:r>
+            <a:r>
+              <a:rPr lang="en-GB" dirty="0"/>
+              <a:t> service </a:t>
             </a:r>
             <a:endParaRPr lang="en-GB" dirty="0"/>
           </a:p>
@@ -9672,7 +9994,9 @@
         </p:nvSpPr>
         <p:spPr/>
         <p:txBody>
-          <a:bodyPr/>
+          <a:bodyPr>
+            <a:normAutofit/>
+          </a:bodyPr>
           <a:lstStyle/>
           <a:p>
             <a:pPr marL="0" indent="0">
@@ -9680,73 +10004,88 @@
             </a:pPr>
             <a:r>
               <a:rPr lang="en-GB" dirty="0" smtClean="0"/>
-              <a:t>Returns the number of shapefiles in the set. This is the same as the highest resolution </a:t>
-            </a:r>
-            <a:r>
-              <a:rPr lang="en-GB" i="1" dirty="0" err="1" smtClean="0"/>
+              <a:t>Fetches </a:t>
+            </a:r>
+            <a:r>
+              <a:rPr lang="en-GB" dirty="0" err="1" smtClean="0"/>
+              <a:t>GeoSpatial</a:t>
+            </a:r>
+            <a:r>
+              <a:rPr lang="en-GB" dirty="0" smtClean="0"/>
+              <a:t> Data. </a:t>
+            </a:r>
+            <a:r>
+              <a:rPr lang="en-GB" dirty="0" smtClean="0"/>
+              <a:t>Normally </a:t>
+            </a:r>
+            <a:r>
+              <a:rPr lang="en-GB" dirty="0" smtClean="0"/>
+              <a:t>called after all other processing is completed, one data set per original shapefile;</a:t>
+            </a:r>
+          </a:p>
+          <a:p>
+            <a:pPr marL="0" indent="0">
+              <a:buNone/>
+            </a:pPr>
+            <a:r>
+              <a:rPr lang="en-GB" dirty="0" smtClean="0"/>
+              <a:t>Input fields: </a:t>
+            </a:r>
+            <a:endParaRPr lang="en-GB" dirty="0" smtClean="0"/>
+          </a:p>
+          <a:p>
+            <a:r>
+              <a:rPr lang="en-GB" dirty="0" smtClean="0"/>
+              <a:t>Name: </a:t>
+            </a:r>
+            <a:r>
+              <a:rPr lang="en-GB" dirty="0" err="1" smtClean="0"/>
+              <a:t>sessionId</a:t>
+            </a:r>
+            <a:r>
+              <a:rPr lang="en-GB" dirty="0" smtClean="0"/>
+              <a:t>			Format: HEX string; </a:t>
+            </a:r>
+          </a:p>
+          <a:p>
+            <a:r>
+              <a:rPr lang="en-GB" dirty="0" smtClean="0"/>
+              <a:t>Name: </a:t>
+            </a:r>
+            <a:r>
+              <a:rPr lang="en-GB" dirty="0" err="1" smtClean="0"/>
+              <a:t>shapefileBaseName</a:t>
+            </a:r>
+            <a:r>
+              <a:rPr lang="en-GB" dirty="0" smtClean="0"/>
+              <a:t>	Format: Valid database column name, 					name of </a:t>
+            </a:r>
+            <a:r>
+              <a:rPr lang="en-GB" dirty="0" err="1" smtClean="0"/>
               <a:t>geolevel</a:t>
             </a:r>
             <a:r>
-              <a:rPr lang="en-GB" i="1" dirty="0" smtClean="0"/>
-              <a:t> id</a:t>
-            </a:r>
-            <a:r>
-              <a:rPr lang="en-GB" dirty="0" smtClean="0"/>
-              <a:t>;</a:t>
-            </a:r>
-          </a:p>
-          <a:p>
-            <a:pPr marL="0" indent="0">
-              <a:buNone/>
-            </a:pPr>
-            <a:r>
-              <a:rPr lang="en-GB" dirty="0" smtClean="0"/>
-              <a:t>Input: </a:t>
-            </a:r>
-          </a:p>
-          <a:p>
-            <a:r>
-              <a:rPr lang="en-GB" dirty="0" smtClean="0"/>
-              <a:t>Name: </a:t>
-            </a:r>
-            <a:r>
-              <a:rPr lang="en-GB" dirty="0" err="1" smtClean="0"/>
-              <a:t>sessionId</a:t>
-            </a:r>
-            <a:r>
-              <a:rPr lang="en-GB" dirty="0" smtClean="0"/>
-              <a:t>		Format: HEX string; </a:t>
-            </a:r>
-          </a:p>
-          <a:p>
-            <a:pPr marL="0" indent="0">
-              <a:buNone/>
-            </a:pPr>
-            <a:r>
-              <a:rPr lang="en-GB" dirty="0" smtClean="0"/>
-              <a:t>Output: </a:t>
-            </a:r>
-          </a:p>
-          <a:p>
-            <a:r>
-              <a:rPr lang="en-GB" dirty="0" smtClean="0"/>
-              <a:t>Name: </a:t>
-            </a:r>
-            <a:r>
-              <a:rPr lang="en-GB" dirty="0" err="1" smtClean="0"/>
-              <a:t>numShapefiles</a:t>
-            </a:r>
-            <a:r>
-              <a:rPr lang="en-GB" dirty="0" smtClean="0"/>
-              <a:t>	Format: Integer.</a:t>
-            </a:r>
+              <a:rPr lang="en-GB" dirty="0"/>
+              <a:t> </a:t>
+            </a:r>
+            <a:r>
+              <a:rPr lang="en-GB" dirty="0" smtClean="0"/>
+              <a:t>and also of original 						shapefile;</a:t>
+            </a:r>
+          </a:p>
+          <a:p>
+            <a:pPr lvl="1"/>
+            <a:endParaRPr lang="en-GB" dirty="0" smtClean="0"/>
+          </a:p>
+          <a:p>
+            <a:endParaRPr lang="en-GB" dirty="0"/>
           </a:p>
         </p:txBody>
       </p:sp>
     </p:spTree>
     <p:extLst>
       <p:ext uri="{BB962C8B-B14F-4D97-AF65-F5344CB8AC3E}">
-        <p14:creationId xmlns:p14="http://schemas.microsoft.com/office/powerpoint/2010/main" val="3484776614"/>
+        <p14:creationId xmlns:p14="http://schemas.microsoft.com/office/powerpoint/2010/main" val="2207147806"/>
       </p:ext>
     </p:extLst>
   </p:cSld>
@@ -9789,8 +10128,24 @@
           <a:lstStyle/>
           <a:p>
             <a:r>
-              <a:rPr lang="en-GB" dirty="0" err="1" smtClean="0"/>
-              <a:t>getMapTile</a:t>
+              <a:rPr lang="en-GB" i="1" dirty="0" err="1"/>
+              <a:t>g</a:t>
+            </a:r>
+            <a:r>
+              <a:rPr lang="en-GB" i="1" dirty="0" err="1" smtClean="0"/>
+              <a:t>etGeospatialData</a:t>
+            </a:r>
+            <a:r>
+              <a:rPr lang="en-GB" dirty="0"/>
+              <a:t> service </a:t>
+            </a:r>
+            <a:r>
+              <a:rPr lang="en-GB" dirty="0" smtClean="0"/>
+              <a:t>(</a:t>
+            </a:r>
+            <a:r>
+              <a:rPr lang="en-GB" dirty="0" smtClean="0"/>
+              <a:t>2)</a:t>
             </a:r>
             <a:endParaRPr lang="en-GB" dirty="0"/>
           </a:p>
@@ -9809,7 +10164,7 @@
         <p:spPr/>
         <p:txBody>
           <a:bodyPr>
-            <a:normAutofit fontScale="92500" lnSpcReduction="20000"/>
+            <a:normAutofit fontScale="92500"/>
           </a:bodyPr>
           <a:lstStyle/>
           <a:p>
@@ -9818,15 +10173,450 @@
             </a:pPr>
             <a:r>
               <a:rPr lang="en-GB" dirty="0" smtClean="0"/>
+              <a:t>Output JSON: </a:t>
+            </a:r>
+            <a:endParaRPr lang="en-GB" dirty="0" smtClean="0"/>
+          </a:p>
+          <a:p>
+            <a:pPr lvl="1"/>
+            <a:r>
+              <a:rPr lang="en-GB" dirty="0" smtClean="0"/>
+              <a:t>Cleaned and valid original data as </a:t>
+            </a:r>
+            <a:r>
+              <a:rPr lang="en-GB" dirty="0" err="1" smtClean="0"/>
+              <a:t>geoJSON</a:t>
+            </a:r>
+            <a:r>
+              <a:rPr lang="en-GB" dirty="0" smtClean="0"/>
+              <a:t> (</a:t>
+            </a:r>
+            <a:r>
+              <a:rPr lang="en-GB" dirty="0" err="1" smtClean="0"/>
+              <a:t>ShapefileGeoJSon</a:t>
+            </a:r>
+            <a:r>
+              <a:rPr lang="en-GB" dirty="0" smtClean="0"/>
+              <a:t>) and Well Known Text (</a:t>
+            </a:r>
+            <a:r>
+              <a:rPr lang="en-GB" dirty="0" err="1" smtClean="0"/>
+              <a:t>ShapefileWkt</a:t>
+            </a:r>
+            <a:r>
+              <a:rPr lang="en-GB" dirty="0" smtClean="0"/>
+              <a:t>);</a:t>
+            </a:r>
+          </a:p>
+          <a:p>
+            <a:pPr lvl="1"/>
+            <a:r>
+              <a:rPr lang="en-GB" dirty="0" err="1" smtClean="0"/>
+              <a:t>OptimisedGeojsonZoomlevel</a:t>
+            </a:r>
+            <a:r>
+              <a:rPr lang="en-GB" dirty="0" smtClean="0"/>
+              <a:t>&lt;</a:t>
+            </a:r>
+            <a:r>
+              <a:rPr lang="en-GB" dirty="0" err="1" smtClean="0"/>
+              <a:t>zoomlevel</a:t>
+            </a:r>
+            <a:r>
+              <a:rPr lang="en-GB" dirty="0" smtClean="0"/>
+              <a:t>&gt;, </a:t>
+            </a:r>
+            <a:r>
+              <a:rPr lang="en-GB" dirty="0" err="1" smtClean="0"/>
+              <a:t>OptimisedWktZoomlevel</a:t>
+            </a:r>
+            <a:r>
+              <a:rPr lang="en-GB" dirty="0" smtClean="0"/>
+              <a:t>&lt;</a:t>
+            </a:r>
+            <a:r>
+              <a:rPr lang="en-GB" dirty="0" err="1" smtClean="0"/>
+              <a:t>zoomlevel</a:t>
+            </a:r>
+            <a:r>
+              <a:rPr lang="en-GB" dirty="0" smtClean="0"/>
+              <a:t>&gt;: Simplified data as </a:t>
+            </a:r>
+            <a:r>
+              <a:rPr lang="en-GB" dirty="0" err="1" smtClean="0"/>
+              <a:t>geoJSON</a:t>
+            </a:r>
+            <a:r>
+              <a:rPr lang="en-GB" dirty="0" smtClean="0"/>
+              <a:t> and Well Known Text (WKT);</a:t>
+            </a:r>
+          </a:p>
+          <a:p>
+            <a:pPr lvl="1"/>
+            <a:r>
+              <a:rPr lang="en-GB" i="1" dirty="0" err="1" smtClean="0"/>
+              <a:t>GeolevelId</a:t>
+            </a:r>
+            <a:r>
+              <a:rPr lang="en-GB" i="1" dirty="0" smtClean="0"/>
+              <a:t>: </a:t>
+            </a:r>
+            <a:r>
+              <a:rPr lang="en-GB" i="1" dirty="0" err="1" smtClean="0"/>
+              <a:t>Geolevel</a:t>
+            </a:r>
+            <a:r>
+              <a:rPr lang="en-GB" i="1" dirty="0" smtClean="0"/>
+              <a:t> ID </a:t>
+            </a:r>
+            <a:r>
+              <a:rPr lang="en-GB" dirty="0" smtClean="0"/>
+              <a:t>(1 to max shapefiles in set)</a:t>
+            </a:r>
+            <a:r>
+              <a:rPr lang="en-GB" i="1" dirty="0" smtClean="0"/>
+              <a:t> </a:t>
+            </a:r>
+            <a:r>
+              <a:rPr lang="en-GB" dirty="0" smtClean="0"/>
+              <a:t>if hierarchical intersection created;</a:t>
+            </a:r>
+          </a:p>
+          <a:p>
+            <a:pPr lvl="1"/>
+            <a:r>
+              <a:rPr lang="en-GB" dirty="0" err="1" smtClean="0"/>
+              <a:t>ShapefileMetadata</a:t>
+            </a:r>
+            <a:r>
+              <a:rPr lang="en-GB" dirty="0" smtClean="0"/>
+              <a:t>: Shapefile </a:t>
+            </a:r>
+            <a:r>
+              <a:rPr lang="en-GB" i="1" dirty="0" smtClean="0"/>
+              <a:t>XML metadata in JSON format </a:t>
+            </a:r>
+            <a:r>
+              <a:rPr lang="en-GB" dirty="0" smtClean="0"/>
+              <a:t>if present;</a:t>
+            </a:r>
+          </a:p>
+          <a:p>
+            <a:pPr lvl="1"/>
+            <a:r>
+              <a:rPr lang="en-GB" dirty="0" smtClean="0"/>
+              <a:t>Projection: Original projection; </a:t>
+            </a:r>
+          </a:p>
+          <a:p>
+            <a:pPr lvl="1"/>
+            <a:r>
+              <a:rPr lang="en-GB" dirty="0" err="1" smtClean="0"/>
+              <a:t>Srid</a:t>
+            </a:r>
+            <a:r>
+              <a:rPr lang="en-GB" dirty="0" smtClean="0"/>
+              <a:t>: SRID</a:t>
+            </a:r>
+          </a:p>
+          <a:p>
+            <a:pPr lvl="1"/>
+            <a:r>
+              <a:rPr lang="en-GB" dirty="0" err="1" smtClean="0"/>
+              <a:t>AreaId</a:t>
+            </a:r>
+            <a:r>
+              <a:rPr lang="en-GB" dirty="0" smtClean="0"/>
+              <a:t>, </a:t>
+            </a:r>
+            <a:r>
+              <a:rPr lang="en-GB" dirty="0" err="1" smtClean="0"/>
+              <a:t>AreaName</a:t>
+            </a:r>
+            <a:r>
+              <a:rPr lang="en-GB" dirty="0" smtClean="0"/>
+              <a:t>: </a:t>
+            </a:r>
+            <a:r>
+              <a:rPr lang="en-GB" i="1" dirty="0" smtClean="0"/>
+              <a:t>area id </a:t>
+            </a:r>
+            <a:r>
+              <a:rPr lang="en-GB" dirty="0" smtClean="0"/>
+              <a:t>and </a:t>
+            </a:r>
+            <a:r>
+              <a:rPr lang="en-GB" i="1" dirty="0" smtClean="0"/>
+              <a:t>area name </a:t>
+            </a:r>
+            <a:r>
+              <a:rPr lang="en-GB" dirty="0" smtClean="0"/>
+              <a:t>field data;</a:t>
+            </a:r>
+          </a:p>
+          <a:p>
+            <a:pPr lvl="1"/>
+            <a:r>
+              <a:rPr lang="en-GB" dirty="0" smtClean="0"/>
+              <a:t>Polygonal and population weighted centroids (see: </a:t>
+            </a:r>
+            <a:r>
+              <a:rPr lang="en-GB" i="1" dirty="0" err="1" smtClean="0"/>
+              <a:t>createCentroids</a:t>
+            </a:r>
+            <a:r>
+              <a:rPr lang="en-GB" i="1" dirty="0" smtClean="0"/>
+              <a:t>)</a:t>
+            </a:r>
+            <a:endParaRPr lang="en-GB" dirty="0" smtClean="0"/>
+          </a:p>
+          <a:p>
+            <a:pPr marL="0" indent="0">
+              <a:buNone/>
+            </a:pPr>
+            <a:endParaRPr lang="en-GB" dirty="0"/>
+          </a:p>
+        </p:txBody>
+      </p:sp>
+    </p:spTree>
+    <p:extLst>
+      <p:ext uri="{BB962C8B-B14F-4D97-AF65-F5344CB8AC3E}">
+        <p14:creationId xmlns:p14="http://schemas.microsoft.com/office/powerpoint/2010/main" val="3775498934"/>
+      </p:ext>
+    </p:extLst>
+  </p:cSld>
+  <p:clrMapOvr>
+    <a:masterClrMapping/>
+  </p:clrMapOvr>
+</p:sld>
+</file>
+
+<file path=ppt/slides/slide34.xml><?xml version="1.0" encoding="utf-8"?>
+<p:sld xmlns:a="http://schemas.openxmlformats.org/drawingml/2006/main" xmlns:r="http://schemas.openxmlformats.org/officeDocument/2006/relationships" xmlns:p="http://schemas.openxmlformats.org/presentationml/2006/main">
+  <p:cSld>
+    <p:spTree>
+      <p:nvGrpSpPr>
+        <p:cNvPr id="1" name=""/>
+        <p:cNvGrpSpPr/>
+        <p:nvPr/>
+      </p:nvGrpSpPr>
+      <p:grpSpPr>
+        <a:xfrm>
+          <a:off x="0" y="0"/>
+          <a:ext cx="0" cy="0"/>
+          <a:chOff x="0" y="0"/>
+          <a:chExt cx="0" cy="0"/>
+        </a:xfrm>
+      </p:grpSpPr>
+      <p:sp>
+        <p:nvSpPr>
+          <p:cNvPr id="2" name="Title 1"/>
+          <p:cNvSpPr>
+            <a:spLocks noGrp="1"/>
+          </p:cNvSpPr>
+          <p:nvPr>
+            <p:ph type="title"/>
+          </p:nvPr>
+        </p:nvSpPr>
+        <p:spPr/>
+        <p:txBody>
+          <a:bodyPr/>
+          <a:lstStyle/>
+          <a:p>
+            <a:r>
+              <a:rPr lang="en-GB" i="1" dirty="0" err="1" smtClean="0"/>
+              <a:t>getNumShapefilesInSet</a:t>
+            </a:r>
+            <a:r>
+              <a:rPr lang="en-GB" dirty="0"/>
+              <a:t> service </a:t>
+            </a:r>
+            <a:endParaRPr lang="en-GB" dirty="0"/>
+          </a:p>
+        </p:txBody>
+      </p:sp>
+      <p:sp>
+        <p:nvSpPr>
+          <p:cNvPr id="3" name="Content Placeholder 2"/>
+          <p:cNvSpPr>
+            <a:spLocks noGrp="1"/>
+          </p:cNvSpPr>
+          <p:nvPr>
+            <p:ph idx="1"/>
+          </p:nvPr>
+        </p:nvSpPr>
+        <p:spPr/>
+        <p:txBody>
+          <a:bodyPr/>
+          <a:lstStyle/>
+          <a:p>
+            <a:pPr marL="0" indent="0">
+              <a:buNone/>
+            </a:pPr>
+            <a:r>
+              <a:rPr lang="en-GB" dirty="0" smtClean="0"/>
+              <a:t>Returns the number of shapefiles in the set. This is the same as the highest resolution </a:t>
+            </a:r>
+            <a:r>
+              <a:rPr lang="en-GB" i="1" dirty="0" err="1" smtClean="0"/>
+              <a:t>geolevel</a:t>
+            </a:r>
+            <a:r>
+              <a:rPr lang="en-GB" i="1" dirty="0" smtClean="0"/>
+              <a:t> </a:t>
+            </a:r>
+            <a:r>
+              <a:rPr lang="en-GB" i="1" dirty="0" smtClean="0"/>
+              <a:t>id</a:t>
+            </a:r>
+            <a:r>
+              <a:rPr lang="en-GB" dirty="0" smtClean="0"/>
+              <a:t>;</a:t>
+            </a:r>
+            <a:endParaRPr lang="en-GB" dirty="0" smtClean="0"/>
+          </a:p>
+          <a:p>
+            <a:pPr marL="0" indent="0">
+              <a:buNone/>
+            </a:pPr>
+            <a:r>
+              <a:rPr lang="en-GB" dirty="0" smtClean="0"/>
+              <a:t>Input fields: </a:t>
+            </a:r>
+            <a:endParaRPr lang="en-GB" dirty="0" smtClean="0"/>
+          </a:p>
+          <a:p>
+            <a:r>
+              <a:rPr lang="en-GB" dirty="0" smtClean="0"/>
+              <a:t>Name: </a:t>
+            </a:r>
+            <a:r>
+              <a:rPr lang="en-GB" dirty="0" err="1" smtClean="0"/>
+              <a:t>sessionId</a:t>
+            </a:r>
+            <a:r>
+              <a:rPr lang="en-GB" dirty="0" smtClean="0"/>
+              <a:t>		Format: HEX string; </a:t>
+            </a:r>
+          </a:p>
+          <a:p>
+            <a:pPr marL="0" indent="0">
+              <a:buNone/>
+            </a:pPr>
+            <a:r>
+              <a:rPr lang="en-GB" dirty="0" smtClean="0"/>
+              <a:t>Output JSON: </a:t>
+            </a:r>
+            <a:endParaRPr lang="en-GB" dirty="0" smtClean="0"/>
+          </a:p>
+          <a:p>
+            <a:r>
+              <a:rPr lang="en-GB" dirty="0" smtClean="0"/>
+              <a:t>Name: </a:t>
+            </a:r>
+            <a:r>
+              <a:rPr lang="en-GB" dirty="0" err="1" smtClean="0"/>
+              <a:t>numShapefiles</a:t>
+            </a:r>
+            <a:r>
+              <a:rPr lang="en-GB" dirty="0" smtClean="0"/>
+              <a:t>	Format: Integer.</a:t>
+            </a:r>
+          </a:p>
+        </p:txBody>
+      </p:sp>
+    </p:spTree>
+    <p:extLst>
+      <p:ext uri="{BB962C8B-B14F-4D97-AF65-F5344CB8AC3E}">
+        <p14:creationId xmlns:p14="http://schemas.microsoft.com/office/powerpoint/2010/main" val="3484776614"/>
+      </p:ext>
+    </p:extLst>
+  </p:cSld>
+  <p:clrMapOvr>
+    <a:masterClrMapping/>
+  </p:clrMapOvr>
+</p:sld>
+</file>
+
+<file path=ppt/slides/slide35.xml><?xml version="1.0" encoding="utf-8"?>
+<p:sld xmlns:a="http://schemas.openxmlformats.org/drawingml/2006/main" xmlns:r="http://schemas.openxmlformats.org/officeDocument/2006/relationships" xmlns:p="http://schemas.openxmlformats.org/presentationml/2006/main">
+  <p:cSld>
+    <p:spTree>
+      <p:nvGrpSpPr>
+        <p:cNvPr id="1" name=""/>
+        <p:cNvGrpSpPr/>
+        <p:nvPr/>
+      </p:nvGrpSpPr>
+      <p:grpSpPr>
+        <a:xfrm>
+          <a:off x="0" y="0"/>
+          <a:ext cx="0" cy="0"/>
+          <a:chOff x="0" y="0"/>
+          <a:chExt cx="0" cy="0"/>
+        </a:xfrm>
+      </p:grpSpPr>
+      <p:sp>
+        <p:nvSpPr>
+          <p:cNvPr id="2" name="Title 1"/>
+          <p:cNvSpPr>
+            <a:spLocks noGrp="1"/>
+          </p:cNvSpPr>
+          <p:nvPr>
+            <p:ph type="title"/>
+          </p:nvPr>
+        </p:nvSpPr>
+        <p:spPr/>
+        <p:txBody>
+          <a:bodyPr/>
+          <a:lstStyle/>
+          <a:p>
+            <a:r>
+              <a:rPr lang="en-GB" i="1" dirty="0" err="1" smtClean="0"/>
+              <a:t>getMapTile</a:t>
+            </a:r>
+            <a:r>
+              <a:rPr lang="en-GB" dirty="0"/>
+              <a:t> service </a:t>
+            </a:r>
+            <a:endParaRPr lang="en-GB" dirty="0"/>
+          </a:p>
+        </p:txBody>
+      </p:sp>
+      <p:sp>
+        <p:nvSpPr>
+          <p:cNvPr id="3" name="Content Placeholder 2"/>
+          <p:cNvSpPr>
+            <a:spLocks noGrp="1"/>
+          </p:cNvSpPr>
+          <p:nvPr>
+            <p:ph idx="1"/>
+          </p:nvPr>
+        </p:nvSpPr>
+        <p:spPr/>
+        <p:txBody>
+          <a:bodyPr>
+            <a:normAutofit fontScale="85000" lnSpcReduction="20000"/>
+          </a:bodyPr>
+          <a:lstStyle/>
+          <a:p>
+            <a:pPr marL="0" indent="0">
+              <a:buNone/>
+            </a:pPr>
+            <a:r>
+              <a:rPr lang="en-GB" dirty="0" smtClean="0"/>
               <a:t>Get </a:t>
             </a:r>
             <a:r>
               <a:rPr lang="en-GB" dirty="0" err="1" smtClean="0"/>
-              <a:t>maptiles</a:t>
-            </a:r>
-            <a:r>
-              <a:rPr lang="en-GB" dirty="0" smtClean="0"/>
-              <a:t> for specified </a:t>
+              <a:t>maptile</a:t>
+            </a:r>
+            <a:r>
+              <a:rPr lang="en-GB" dirty="0" smtClean="0"/>
+              <a:t> </a:t>
+            </a:r>
+            <a:r>
+              <a:rPr lang="en-GB" dirty="0" smtClean="0"/>
+              <a:t>for specified </a:t>
             </a:r>
             <a:r>
               <a:rPr lang="en-GB" dirty="0" err="1" smtClean="0"/>
@@ -9842,8 +10632,29 @@
             </a:r>
             <a:r>
               <a:rPr lang="en-GB" dirty="0" smtClean="0"/>
-              <a:t>, X and Y tile number; </a:t>
-            </a:r>
+              <a:t>, X and Y tile </a:t>
+            </a:r>
+            <a:r>
+              <a:rPr lang="en-GB" dirty="0" smtClean="0"/>
+              <a:t>number. The </a:t>
+            </a:r>
+            <a:r>
+              <a:rPr lang="en-GB" i="1" dirty="0" err="1" smtClean="0"/>
+              <a:t>createMaptiles</a:t>
+            </a:r>
+            <a:r>
+              <a:rPr lang="en-GB" i="1" dirty="0" smtClean="0"/>
+              <a:t> </a:t>
+            </a:r>
+            <a:r>
+              <a:rPr lang="en-GB" dirty="0" smtClean="0"/>
+              <a:t>service return the table data needed to iterate through all the tiles</a:t>
+            </a:r>
+            <a:r>
+              <a:rPr lang="en-GB" dirty="0" smtClean="0"/>
+              <a:t>; </a:t>
+            </a:r>
+            <a:endParaRPr lang="en-GB" dirty="0" smtClean="0"/>
           </a:p>
           <a:p>
             <a:pPr marL="0" indent="0">
@@ -9851,8 +10662,9 @@
             </a:pPr>
             <a:r>
               <a:rPr lang="en-GB" dirty="0" smtClean="0"/>
-              <a:t>Input: </a:t>
-            </a:r>
+              <a:t>Input fields: </a:t>
+            </a:r>
+            <a:endParaRPr lang="en-GB" dirty="0" smtClean="0"/>
           </a:p>
           <a:p>
             <a:r>
@@ -9883,7 +10695,15 @@
             </a:r>
             <a:r>
               <a:rPr lang="en-GB" dirty="0" smtClean="0"/>
-              <a:t>	Format Integer, </a:t>
+              <a:t>	</a:t>
+            </a:r>
+            <a:r>
+              <a:rPr lang="en-GB" dirty="0" smtClean="0"/>
+              <a:t>	Format </a:t>
+            </a:r>
+            <a:r>
+              <a:rPr lang="en-GB" dirty="0" smtClean="0"/>
+              <a:t>Integer, </a:t>
             </a:r>
             <a:r>
               <a:rPr lang="en-GB" dirty="0" err="1"/>
@@ -9903,7 +10723,15 @@
             </a:r>
             <a:r>
               <a:rPr lang="en-GB" dirty="0" smtClean="0"/>
-              <a:t>, 				default: 11, maximum: 19);</a:t>
+              <a:t>, 				</a:t>
+            </a:r>
+            <a:r>
+              <a:rPr lang="en-GB" dirty="0" smtClean="0"/>
+              <a:t>	default</a:t>
+            </a:r>
+            <a:r>
+              <a:rPr lang="en-GB" dirty="0" smtClean="0"/>
+              <a:t>: 11, maximum: 19);</a:t>
             </a:r>
           </a:p>
           <a:p>
@@ -9921,11 +10749,7 @@
             </a:r>
             <a:r>
               <a:rPr lang="en-GB" dirty="0" smtClean="0"/>
-              <a:t>	Format: Integer, n</a:t>
-            </a:r>
-            <a:r>
-              <a:rPr lang="en-GB" dirty="0" smtClean="0"/>
-              <a:t>umeric </a:t>
+              <a:t>	Format: Integer, numeric </a:t>
             </a:r>
             <a:r>
               <a:rPr lang="en-GB" dirty="0" err="1" smtClean="0"/>
@@ -9933,7 +10757,15 @@
             </a:r>
             <a:r>
               <a:rPr lang="en-GB" dirty="0" smtClean="0"/>
-              <a:t> after 					hierarchy created (1-number of shapefiles); </a:t>
+              <a:t> after 					</a:t>
+            </a:r>
+            <a:r>
+              <a:rPr lang="en-GB" dirty="0" smtClean="0"/>
+              <a:t>	hierarchy </a:t>
+            </a:r>
+            <a:r>
+              <a:rPr lang="en-GB" dirty="0" smtClean="0"/>
+              <a:t>created (1-number of shapefiles); </a:t>
             </a:r>
           </a:p>
           <a:p>
@@ -9947,11 +10779,7 @@
             </a:r>
             <a:r>
               <a:rPr lang="en-GB" dirty="0" smtClean="0"/>
-              <a:t>		Format: Integer</a:t>
-            </a:r>
-            <a:r>
-              <a:rPr lang="en-GB" dirty="0" smtClean="0"/>
-              <a:t>; </a:t>
+              <a:t>		Format: Integer; </a:t>
             </a:r>
           </a:p>
           <a:p>
@@ -9978,8 +10806,9 @@
             </a:pPr>
             <a:r>
               <a:rPr lang="en-GB" dirty="0" smtClean="0"/>
-              <a:t>Output:</a:t>
-            </a:r>
+              <a:t>Output JSON:</a:t>
+            </a:r>
+            <a:endParaRPr lang="en-GB" dirty="0" smtClean="0"/>
           </a:p>
           <a:p>
             <a:r>
@@ -10250,7 +11079,23 @@
           <a:p>
             <a:r>
               <a:rPr lang="en-GB" dirty="0" smtClean="0"/>
-              <a:t>Since multiple processing steps are envisaged thence the server will need to maintain state; </a:t>
+              <a:t>Since multiple processing steps are envisaged </a:t>
+            </a:r>
+            <a:r>
+              <a:rPr lang="en-GB" dirty="0" smtClean="0"/>
+              <a:t>the </a:t>
+            </a:r>
+            <a:r>
+              <a:rPr lang="en-GB" dirty="0" smtClean="0"/>
+              <a:t>server will </a:t>
+            </a:r>
+            <a:r>
+              <a:rPr lang="en-GB" dirty="0" smtClean="0"/>
+              <a:t>be required to </a:t>
+            </a:r>
+            <a:r>
+              <a:rPr lang="en-GB" dirty="0" smtClean="0"/>
+              <a:t>maintain state; </a:t>
             </a:r>
           </a:p>
           <a:p>
@@ -10272,13 +11117,21 @@
             </a:r>
             <a:r>
               <a:rPr lang="en-GB" dirty="0" smtClean="0"/>
-              <a:t> table;</a:t>
-            </a:r>
-          </a:p>
-          <a:p>
-            <a:r>
-              <a:rPr lang="en-GB" dirty="0" smtClean="0"/>
-              <a:t>This will reduce the data be transferred to a minimum.</a:t>
+              <a:t>/SQL server </a:t>
+            </a:r>
+            <a:r>
+              <a:rPr lang="en-GB" dirty="0" smtClean="0"/>
+              <a:t>table;</a:t>
+            </a:r>
+          </a:p>
+          <a:p>
+            <a:r>
+              <a:rPr lang="en-GB" dirty="0" smtClean="0"/>
+              <a:t>Maintaining state will </a:t>
+            </a:r>
+            <a:r>
+              <a:rPr lang="en-GB" dirty="0" smtClean="0"/>
+              <a:t>reduce the data be transferred to a minimum.</a:t>
             </a:r>
             <a:endParaRPr lang="en-GB" dirty="0"/>
           </a:p>
@@ -10330,8 +11183,12 @@
           <a:lstStyle/>
           <a:p>
             <a:r>
+              <a:rPr lang="en-GB" dirty="0" smtClean="0"/>
+              <a:t>RIF</a:t>
+            </a:r>
+            <a:r>
               <a:rPr lang="en-GB" i="1" dirty="0" smtClean="0"/>
-              <a:t>RIF </a:t>
+              <a:t> </a:t>
             </a:r>
             <a:r>
               <a:rPr lang="en-GB" i="1" dirty="0" err="1" smtClean="0"/>
@@ -10358,7 +11215,7 @@
         <p:spPr/>
         <p:txBody>
           <a:bodyPr>
-            <a:normAutofit/>
+            <a:normAutofit fontScale="92500"/>
           </a:bodyPr>
           <a:lstStyle/>
           <a:p>
@@ -10367,7 +11224,78 @@
             </a:pPr>
             <a:r>
               <a:rPr lang="en-GB" dirty="0" smtClean="0"/>
-              <a:t>It is not intended at present to support:</a:t>
+              <a:t>It is not intended at present to support</a:t>
+            </a:r>
+            <a:r>
+              <a:rPr lang="en-GB" dirty="0" smtClean="0"/>
+              <a:t>:</a:t>
+            </a:r>
+            <a:endParaRPr lang="en-GB" dirty="0" smtClean="0"/>
+          </a:p>
+          <a:p>
+            <a:r>
+              <a:rPr lang="en-GB" dirty="0" smtClean="0"/>
+              <a:t>Shapefile formats not supported by Node SHP/</a:t>
+            </a:r>
+            <a:r>
+              <a:rPr lang="en-GB" dirty="0" err="1" smtClean="0"/>
+              <a:t>MapShaper</a:t>
+            </a:r>
+            <a:r>
+              <a:rPr lang="en-GB" dirty="0" smtClean="0"/>
+              <a:t>;</a:t>
+            </a:r>
+          </a:p>
+          <a:p>
+            <a:r>
+              <a:rPr lang="en-GB" dirty="0" smtClean="0"/>
+              <a:t>To convert a) </a:t>
+            </a:r>
+            <a:r>
+              <a:rPr lang="en-GB" dirty="0" err="1" smtClean="0"/>
+              <a:t>TopoJSON</a:t>
+            </a:r>
+            <a:r>
+              <a:rPr lang="en-GB" dirty="0" smtClean="0"/>
+              <a:t> </a:t>
+            </a:r>
+            <a:r>
+              <a:rPr lang="en-GB" dirty="0" smtClean="0"/>
+              <a:t>or b</a:t>
+            </a:r>
+            <a:r>
+              <a:rPr lang="en-GB" dirty="0" smtClean="0"/>
+              <a:t>) Well known text to </a:t>
+            </a:r>
+            <a:r>
+              <a:rPr lang="en-GB" dirty="0" err="1" smtClean="0"/>
+              <a:t>GeoJSON</a:t>
+            </a:r>
+            <a:r>
+              <a:rPr lang="en-GB" dirty="0" smtClean="0"/>
+              <a:t>;</a:t>
+            </a:r>
+          </a:p>
+          <a:p>
+            <a:r>
+              <a:rPr lang="en-GB" dirty="0" smtClean="0"/>
+              <a:t>To convert a) </a:t>
+            </a:r>
+            <a:r>
+              <a:rPr lang="en-GB" dirty="0" err="1" smtClean="0"/>
+              <a:t>TopoJSON</a:t>
+            </a:r>
+            <a:r>
+              <a:rPr lang="en-GB" dirty="0" smtClean="0"/>
+              <a:t> or b) </a:t>
+            </a:r>
+            <a:r>
+              <a:rPr lang="en-GB" dirty="0" err="1" smtClean="0"/>
+              <a:t>GeoSON</a:t>
+            </a:r>
+            <a:r>
+              <a:rPr lang="en-GB" dirty="0" smtClean="0"/>
+              <a:t> to shapefiles.</a:t>
             </a:r>
           </a:p>
           <a:p>
@@ -10377,84 +11305,63 @@
             <a:endParaRPr lang="en-GB" dirty="0" smtClean="0"/>
           </a:p>
           <a:p>
-            <a:r>
-              <a:rPr lang="en-GB" dirty="0" smtClean="0"/>
-              <a:t>Shapefile formats not supported by Node SHP/</a:t>
-            </a:r>
-            <a:r>
-              <a:rPr lang="en-GB" dirty="0" err="1" smtClean="0"/>
-              <a:t>MapShaper</a:t>
-            </a:r>
-            <a:r>
-              <a:rPr lang="en-GB" dirty="0" smtClean="0"/>
-              <a:t>;</a:t>
-            </a:r>
-          </a:p>
-          <a:p>
-            <a:r>
-              <a:rPr lang="en-GB" dirty="0" smtClean="0"/>
-              <a:t>To convert a) </a:t>
-            </a:r>
-            <a:r>
-              <a:rPr lang="en-GB" dirty="0" err="1" smtClean="0"/>
-              <a:t>TopoJSON</a:t>
-            </a:r>
-            <a:r>
-              <a:rPr lang="en-GB" dirty="0" smtClean="0"/>
-              <a:t> orb) Well known text to </a:t>
-            </a:r>
-            <a:r>
-              <a:rPr lang="en-GB" dirty="0" err="1" smtClean="0"/>
-              <a:t>GeoJSON</a:t>
-            </a:r>
-            <a:r>
-              <a:rPr lang="en-GB" dirty="0" smtClean="0"/>
-              <a:t>;</a:t>
-            </a:r>
-          </a:p>
-          <a:p>
-            <a:r>
-              <a:rPr lang="en-GB" dirty="0" smtClean="0"/>
-              <a:t>To convert a) </a:t>
-            </a:r>
-            <a:r>
-              <a:rPr lang="en-GB" dirty="0" err="1" smtClean="0"/>
-              <a:t>TopoJSON</a:t>
-            </a:r>
-            <a:r>
-              <a:rPr lang="en-GB" dirty="0" smtClean="0"/>
-              <a:t> or b) </a:t>
-            </a:r>
-            <a:r>
-              <a:rPr lang="en-GB" dirty="0" err="1" smtClean="0"/>
-              <a:t>GeoSON</a:t>
-            </a:r>
-            <a:r>
-              <a:rPr lang="en-GB" dirty="0" smtClean="0"/>
-              <a:t> to shapefiles.</a:t>
-            </a:r>
-          </a:p>
-          <a:p>
             <a:pPr marL="0" indent="0">
               <a:buNone/>
             </a:pPr>
-            <a:endParaRPr lang="en-GB" dirty="0" smtClean="0"/>
+            <a:r>
+              <a:rPr lang="en-GB" dirty="0" smtClean="0"/>
+              <a:t>This is technically possible, but requires GDAL; </a:t>
+            </a:r>
+            <a:r>
+              <a:rPr lang="en-GB" dirty="0" err="1" smtClean="0"/>
+              <a:t>PostGIS</a:t>
+            </a:r>
+            <a:r>
+              <a:rPr lang="en-GB" dirty="0" smtClean="0"/>
+              <a:t> uses GDAL</a:t>
+            </a:r>
+            <a:r>
+              <a:rPr lang="en-GB" dirty="0" smtClean="0"/>
+              <a:t>.</a:t>
+            </a:r>
           </a:p>
           <a:p>
             <a:pPr marL="0" indent="0">
               <a:buNone/>
             </a:pPr>
-            <a:r>
-              <a:rPr lang="en-GB" dirty="0" smtClean="0"/>
-              <a:t>This is technically possible, but requires GDAL; </a:t>
-            </a:r>
-            <a:r>
-              <a:rPr lang="en-GB" dirty="0" err="1" smtClean="0"/>
-              <a:t>PostGIS</a:t>
-            </a:r>
-            <a:r>
-              <a:rPr lang="en-GB" dirty="0" smtClean="0"/>
-              <a:t> uses GDAL.</a:t>
+            <a:endParaRPr lang="en-GB" dirty="0"/>
+          </a:p>
+          <a:p>
+            <a:pPr marL="0" indent="0">
+              <a:buNone/>
+            </a:pPr>
+            <a:r>
+              <a:rPr lang="en-GB" dirty="0" smtClean="0"/>
+              <a:t>This is only required to assist in visualising the data and producing outputs; </a:t>
+            </a:r>
+            <a:r>
+              <a:rPr lang="en-GB" dirty="0"/>
+              <a:t>RIF</a:t>
+            </a:r>
+            <a:r>
+              <a:rPr lang="en-GB" i="1" dirty="0"/>
+              <a:t> </a:t>
+            </a:r>
+            <a:r>
+              <a:rPr lang="en-GB" i="1" dirty="0" err="1"/>
+              <a:t>NodeGeoSpatialServices</a:t>
+            </a:r>
+            <a:r>
+              <a:rPr lang="en-GB" dirty="0" smtClean="0"/>
+              <a:t> are </a:t>
+            </a:r>
+            <a:r>
+              <a:rPr lang="en-GB" smtClean="0"/>
+              <a:t>currently only </a:t>
+            </a:r>
+            <a:r>
+              <a:rPr lang="en-GB" dirty="0" smtClean="0"/>
+              <a:t>intended for data loading.</a:t>
             </a:r>
             <a:endParaRPr lang="en-GB" dirty="0"/>
           </a:p>

</xml_diff>

<commit_message>
Add remaining options as per spec
</commit_message>
<xml_diff>
--- a/rifNodeServices/NodeGeoSpatialServices.pptx
+++ b/rifNodeServices/NodeGeoSpatialServices.pptx
@@ -277,7 +277,7 @@
           <a:p>
             <a:fld id="{48F32A67-F634-457D-B9F5-FA4E6813E241}" type="datetimeFigureOut">
               <a:rPr lang="en-GB" smtClean="0"/>
-              <a:t>26/02/2016</a:t>
+              <a:t>09/03/2016</a:t>
             </a:fld>
             <a:endParaRPr lang="en-GB"/>
           </a:p>
@@ -447,7 +447,7 @@
           <a:p>
             <a:fld id="{48F32A67-F634-457D-B9F5-FA4E6813E241}" type="datetimeFigureOut">
               <a:rPr lang="en-GB" smtClean="0"/>
-              <a:t>26/02/2016</a:t>
+              <a:t>09/03/2016</a:t>
             </a:fld>
             <a:endParaRPr lang="en-GB"/>
           </a:p>
@@ -627,7 +627,7 @@
           <a:p>
             <a:fld id="{48F32A67-F634-457D-B9F5-FA4E6813E241}" type="datetimeFigureOut">
               <a:rPr lang="en-GB" smtClean="0"/>
-              <a:t>26/02/2016</a:t>
+              <a:t>09/03/2016</a:t>
             </a:fld>
             <a:endParaRPr lang="en-GB"/>
           </a:p>
@@ -797,7 +797,7 @@
           <a:p>
             <a:fld id="{48F32A67-F634-457D-B9F5-FA4E6813E241}" type="datetimeFigureOut">
               <a:rPr lang="en-GB" smtClean="0"/>
-              <a:t>26/02/2016</a:t>
+              <a:t>09/03/2016</a:t>
             </a:fld>
             <a:endParaRPr lang="en-GB"/>
           </a:p>
@@ -1043,7 +1043,7 @@
           <a:p>
             <a:fld id="{48F32A67-F634-457D-B9F5-FA4E6813E241}" type="datetimeFigureOut">
               <a:rPr lang="en-GB" smtClean="0"/>
-              <a:t>26/02/2016</a:t>
+              <a:t>09/03/2016</a:t>
             </a:fld>
             <a:endParaRPr lang="en-GB"/>
           </a:p>
@@ -1275,7 +1275,7 @@
           <a:p>
             <a:fld id="{48F32A67-F634-457D-B9F5-FA4E6813E241}" type="datetimeFigureOut">
               <a:rPr lang="en-GB" smtClean="0"/>
-              <a:t>26/02/2016</a:t>
+              <a:t>09/03/2016</a:t>
             </a:fld>
             <a:endParaRPr lang="en-GB"/>
           </a:p>
@@ -1642,7 +1642,7 @@
           <a:p>
             <a:fld id="{48F32A67-F634-457D-B9F5-FA4E6813E241}" type="datetimeFigureOut">
               <a:rPr lang="en-GB" smtClean="0"/>
-              <a:t>26/02/2016</a:t>
+              <a:t>09/03/2016</a:t>
             </a:fld>
             <a:endParaRPr lang="en-GB"/>
           </a:p>
@@ -1760,7 +1760,7 @@
           <a:p>
             <a:fld id="{48F32A67-F634-457D-B9F5-FA4E6813E241}" type="datetimeFigureOut">
               <a:rPr lang="en-GB" smtClean="0"/>
-              <a:t>26/02/2016</a:t>
+              <a:t>09/03/2016</a:t>
             </a:fld>
             <a:endParaRPr lang="en-GB"/>
           </a:p>
@@ -1855,7 +1855,7 @@
           <a:p>
             <a:fld id="{48F32A67-F634-457D-B9F5-FA4E6813E241}" type="datetimeFigureOut">
               <a:rPr lang="en-GB" smtClean="0"/>
-              <a:t>26/02/2016</a:t>
+              <a:t>09/03/2016</a:t>
             </a:fld>
             <a:endParaRPr lang="en-GB"/>
           </a:p>
@@ -2132,7 +2132,7 @@
           <a:p>
             <a:fld id="{48F32A67-F634-457D-B9F5-FA4E6813E241}" type="datetimeFigureOut">
               <a:rPr lang="en-GB" smtClean="0"/>
-              <a:t>26/02/2016</a:t>
+              <a:t>09/03/2016</a:t>
             </a:fld>
             <a:endParaRPr lang="en-GB"/>
           </a:p>
@@ -2385,7 +2385,7 @@
           <a:p>
             <a:fld id="{48F32A67-F634-457D-B9F5-FA4E6813E241}" type="datetimeFigureOut">
               <a:rPr lang="en-GB" smtClean="0"/>
-              <a:t>26/02/2016</a:t>
+              <a:t>09/03/2016</a:t>
             </a:fld>
             <a:endParaRPr lang="en-GB"/>
           </a:p>
@@ -2598,7 +2598,7 @@
           <a:p>
             <a:fld id="{48F32A67-F634-457D-B9F5-FA4E6813E241}" type="datetimeFigureOut">
               <a:rPr lang="en-GB" smtClean="0"/>
-              <a:t>26/02/2016</a:t>
+              <a:t>09/03/2016</a:t>
             </a:fld>
             <a:endParaRPr lang="en-GB"/>
           </a:p>
@@ -3128,11 +3128,7 @@
             </a:r>
             <a:r>
               <a:rPr lang="en-GB" i="1" dirty="0" smtClean="0"/>
-              <a:t> </a:t>
-            </a:r>
-            <a:r>
-              <a:rPr lang="en-GB" i="1" dirty="0" smtClean="0"/>
-              <a:t>shp2GeoJSON </a:t>
+              <a:t> shp2GeoJSON </a:t>
             </a:r>
             <a:r>
               <a:rPr lang="en-GB" dirty="0" smtClean="0"/>
@@ -6320,11 +6316,7 @@
             </a:r>
             <a:r>
               <a:rPr lang="en-GB" dirty="0" smtClean="0"/>
-              <a:t> </a:t>
-            </a:r>
-            <a:r>
-              <a:rPr lang="en-GB" dirty="0" smtClean="0"/>
-              <a:t>service;</a:t>
+              <a:t> service;</a:t>
             </a:r>
           </a:p>
           <a:p>
@@ -6345,11 +6337,7 @@
             </a:r>
             <a:r>
               <a:rPr lang="en-GB" i="1" dirty="0" smtClean="0"/>
-              <a:t> </a:t>
-            </a:r>
-            <a:r>
-              <a:rPr lang="en-GB" i="1" dirty="0" smtClean="0"/>
-              <a:t>service</a:t>
+              <a:t> service</a:t>
             </a:r>
             <a:r>
               <a:rPr lang="en-GB" dirty="0" smtClean="0"/>
@@ -7384,11 +7372,7 @@
             </a:r>
             <a:r>
               <a:rPr lang="en-GB" i="1" dirty="0" smtClean="0"/>
-              <a:t>hp2GeoJSON</a:t>
-            </a:r>
-            <a:r>
-              <a:rPr lang="en-GB" i="1" dirty="0" smtClean="0"/>
-              <a:t>: </a:t>
+              <a:t>hp2GeoJSON: </a:t>
             </a:r>
             <a:r>
               <a:rPr lang="en-GB" dirty="0"/>
@@ -7843,29 +7827,27 @@
           <a:p>
             <a:r>
               <a:rPr lang="en-GB" dirty="0" smtClean="0"/>
-              <a:t>Name: </a:t>
-            </a:r>
-            <a:r>
-              <a:rPr lang="en-GB" dirty="0" err="1" smtClean="0"/>
-              <a:t>geometryColumn</a:t>
-            </a:r>
-            <a:r>
-              <a:rPr lang="en-GB" dirty="0" smtClean="0"/>
-              <a:t>	Format: Valid database column name;</a:t>
-            </a:r>
-          </a:p>
-          <a:p>
-            <a:r>
-              <a:rPr lang="en-GB" dirty="0" smtClean="0"/>
-              <a:t>Name: </a:t>
-            </a:r>
-            <a:r>
-              <a:rPr lang="en-GB" dirty="0" err="1" smtClean="0"/>
-              <a:t>sessionId</a:t>
-            </a:r>
-            <a:r>
-              <a:rPr lang="en-GB" dirty="0" smtClean="0"/>
-              <a:t>		Format: HEX string; NULL for first shapefile in session; </a:t>
+              <a:t>Name</a:t>
+            </a:r>
+            <a:r>
+              <a:rPr lang="en-GB" dirty="0" smtClean="0"/>
+              <a:t>: </a:t>
+            </a:r>
+            <a:r>
+              <a:rPr lang="en-GB" dirty="0" smtClean="0"/>
+              <a:t>uuidV1</a:t>
+            </a:r>
+            <a:r>
+              <a:rPr lang="en-GB" dirty="0" smtClean="0"/>
+              <a:t>		</a:t>
+            </a:r>
+            <a:r>
+              <a:rPr lang="en-GB" dirty="0" smtClean="0"/>
+              <a:t>	Format</a:t>
+            </a:r>
+            <a:r>
+              <a:rPr lang="en-GB" dirty="0" smtClean="0"/>
+              <a:t>: HEX string; NULL for first shapefile in session; </a:t>
             </a:r>
           </a:p>
           <a:p>
@@ -7879,7 +7861,27 @@
             </a:r>
             <a:r>
               <a:rPr lang="en-GB" dirty="0" smtClean="0"/>
-              <a:t> stored in server.</a:t>
+              <a:t> </a:t>
+            </a:r>
+            <a:r>
+              <a:rPr lang="en-GB" dirty="0" err="1" smtClean="0"/>
+              <a:t>GeoJSON</a:t>
+            </a:r>
+            <a:r>
+              <a:rPr lang="en-GB" dirty="0" smtClean="0"/>
+              <a:t> stored </a:t>
+            </a:r>
+            <a:r>
+              <a:rPr lang="en-GB" dirty="0" smtClean="0"/>
+              <a:t>in </a:t>
+            </a:r>
+            <a:r>
+              <a:rPr lang="en-GB" dirty="0" smtClean="0"/>
+              <a:t>					server</a:t>
+            </a:r>
+            <a:r>
+              <a:rPr lang="en-GB" dirty="0" smtClean="0"/>
+              <a:t>.</a:t>
             </a:r>
           </a:p>
           <a:p>
@@ -8137,39 +8139,16 @@
           </a:p>
           <a:p>
             <a:r>
+              <a:rPr lang="en-GB" dirty="0" smtClean="0"/>
+              <a:t>Name</a:t>
+            </a:r>
+            <a:r>
               <a:rPr lang="en-GB" dirty="0"/>
-              <a:t>Name: </a:t>
-            </a:r>
-            <a:r>
-              <a:rPr lang="en-GB" dirty="0" err="1"/>
-              <a:t>wkt</a:t>
-            </a:r>
-            <a:r>
-              <a:rPr lang="en-GB" dirty="0"/>
-              <a:t>			Format: Well Known </a:t>
-            </a:r>
-            <a:r>
-              <a:rPr lang="en-GB" dirty="0" smtClean="0"/>
-              <a:t>Text; </a:t>
-            </a:r>
-            <a:r>
-              <a:rPr lang="en-GB" dirty="0"/>
-              <a:t>returned if </a:t>
-            </a:r>
-            <a:r>
-              <a:rPr lang="en-GB" dirty="0" smtClean="0"/>
-              <a:t>						store=false;</a:t>
-            </a:r>
-            <a:endParaRPr lang="en-GB" dirty="0"/>
-          </a:p>
-          <a:p>
-            <a:r>
-              <a:rPr lang="en-GB" dirty="0"/>
-              <a:t>Name: </a:t>
-            </a:r>
-            <a:r>
-              <a:rPr lang="en-GB" dirty="0" err="1"/>
-              <a:t>sessionId</a:t>
+              <a:t>: </a:t>
+            </a:r>
+            <a:r>
+              <a:rPr lang="en-GB" dirty="0" smtClean="0"/>
+              <a:t>uuidV1</a:t>
             </a:r>
             <a:r>
               <a:rPr lang="en-GB" dirty="0"/>
@@ -8184,21 +8163,29 @@
               <a:t> if </a:t>
             </a:r>
             <a:r>
-              <a:rPr lang="en-GB" dirty="0" err="1"/>
-              <a:t>sessionId</a:t>
+              <a:rPr lang="en-GB" dirty="0" smtClean="0"/>
+              <a:t>uuidV1 </a:t>
             </a:r>
             <a:r>
               <a:rPr lang="en-GB" dirty="0"/>
-              <a:t> is null;</a:t>
-            </a:r>
-          </a:p>
-          <a:p>
+              <a:t>is </a:t>
+            </a:r>
+            <a:r>
+              <a:rPr lang="en-GB" dirty="0" smtClean="0"/>
+              <a:t>				null</a:t>
+            </a:r>
             <a:r>
               <a:rPr lang="en-GB" dirty="0"/>
+              <a:t>;</a:t>
+            </a:r>
+          </a:p>
+          <a:p>
+            <a:r>
+              <a:rPr lang="en-GB" dirty="0" smtClean="0"/>
               <a:t>Name: </a:t>
             </a:r>
             <a:r>
-              <a:rPr lang="en-GB" dirty="0" err="1"/>
+              <a:rPr lang="en-GB" dirty="0" err="1" smtClean="0"/>
               <a:t>geoJson</a:t>
             </a:r>
             <a:r>
@@ -8206,7 +8193,7 @@
               <a:t>		Format: </a:t>
             </a:r>
             <a:r>
-              <a:rPr lang="en-GB" dirty="0" err="1"/>
+              <a:rPr lang="en-GB" dirty="0" err="1" smtClean="0"/>
               <a:t>GeoJSON</a:t>
             </a:r>
             <a:r>
@@ -8359,8 +8346,8 @@
               <a:t>Name: </a:t>
             </a:r>
             <a:r>
-              <a:rPr lang="en-GB" dirty="0" err="1" smtClean="0"/>
-              <a:t>sessionId</a:t>
+              <a:rPr lang="en-GB" dirty="0" smtClean="0"/>
+              <a:t>uuidV1</a:t>
             </a:r>
             <a:r>
               <a:rPr lang="en-GB" dirty="0" smtClean="0"/>
@@ -8812,7 +8799,6 @@
               <a:rPr lang="en-GB" dirty="0" smtClean="0"/>
               <a:t>;</a:t>
             </a:r>
-            <a:endParaRPr lang="en-GB" dirty="0" smtClean="0"/>
           </a:p>
           <a:p>
             <a:pPr marL="0" indent="0">
@@ -9130,8 +9116,8 @@
               <a:t>Name: </a:t>
             </a:r>
             <a:r>
-              <a:rPr lang="en-GB" dirty="0" err="1" smtClean="0"/>
-              <a:t>sessionId</a:t>
+              <a:rPr lang="en-GB" dirty="0" smtClean="0"/>
+              <a:t>uuidV1</a:t>
             </a:r>
             <a:r>
               <a:rPr lang="en-GB" dirty="0" smtClean="0"/>
@@ -9428,8 +9414,8 @@
               <a:t>Name: </a:t>
             </a:r>
             <a:r>
-              <a:rPr lang="en-GB" dirty="0" err="1" smtClean="0"/>
-              <a:t>sessionId</a:t>
+              <a:rPr lang="en-GB" dirty="0" smtClean="0"/>
+              <a:t>uuidV1</a:t>
             </a:r>
             <a:r>
               <a:rPr lang="en-GB" dirty="0" smtClean="0"/>
@@ -9713,8 +9699,8 @@
               <a:t>Name: </a:t>
             </a:r>
             <a:r>
-              <a:rPr lang="en-GB" dirty="0" err="1" smtClean="0"/>
-              <a:t>sessionId</a:t>
+              <a:rPr lang="en-GB" dirty="0" smtClean="0"/>
+              <a:t>uuidV1</a:t>
             </a:r>
             <a:r>
               <a:rPr lang="en-GB" dirty="0" smtClean="0"/>
@@ -9996,8 +9982,8 @@
               <a:t>Name: </a:t>
             </a:r>
             <a:r>
-              <a:rPr lang="en-GB" dirty="0" err="1" smtClean="0"/>
-              <a:t>sessionId</a:t>
+              <a:rPr lang="en-GB" dirty="0" smtClean="0"/>
+              <a:t>uuidV1</a:t>
             </a:r>
             <a:r>
               <a:rPr lang="en-GB" dirty="0" smtClean="0"/>
@@ -10436,8 +10422,8 @@
               <a:t>Name: </a:t>
             </a:r>
             <a:r>
-              <a:rPr lang="en-GB" dirty="0" err="1" smtClean="0"/>
-              <a:t>sessionId</a:t>
+              <a:rPr lang="en-GB" dirty="0" smtClean="0"/>
+              <a:t>uuidV1</a:t>
             </a:r>
             <a:r>
               <a:rPr lang="en-GB" dirty="0" smtClean="0"/>
@@ -10601,8 +10587,8 @@
               <a:t>Name: </a:t>
             </a:r>
             <a:r>
-              <a:rPr lang="en-GB" dirty="0" err="1" smtClean="0"/>
-              <a:t>sessionId</a:t>
+              <a:rPr lang="en-GB" dirty="0" smtClean="0"/>
+              <a:t>uuidV1</a:t>
             </a:r>
             <a:r>
               <a:rPr lang="en-GB" dirty="0" smtClean="0"/>

</xml_diff>